<commit_message>
Tpch Query Implementation - first draft
</commit_message>
<xml_diff>
--- a/resources/STORM.pptx
+++ b/resources/STORM.pptx
@@ -7,6 +7,10 @@
   <p:sldIdLst>
     <p:sldId id="256" r:id="rId2"/>
     <p:sldId id="257" r:id="rId3"/>
+    <p:sldId id="258" r:id="rId4"/>
+    <p:sldId id="259" r:id="rId5"/>
+    <p:sldId id="260" r:id="rId6"/>
+    <p:sldId id="261" r:id="rId7"/>
   </p:sldIdLst>
   <p:sldSz cx="12192000" cy="6858000"/>
   <p:notesSz cx="6858000" cy="9144000"/>
@@ -105,7 +109,4317 @@
       </a:defRPr>
     </a:lvl9pPr>
   </p:defaultTextStyle>
+  <p:extLst>
+    <p:ext uri="{EFAFB233-063F-42B5-8137-9DF3F51BA10A}">
+      <p15:sldGuideLst xmlns:p15="http://schemas.microsoft.com/office/powerpoint/2012/main"/>
+    </p:ext>
+  </p:extLst>
 </p:presentation>
+</file>
+
+<file path=ppt/charts/chart1.xml><?xml version="1.0" encoding="utf-8"?>
+<c:chartSpace xmlns:c="http://schemas.openxmlformats.org/drawingml/2006/chart" xmlns:a="http://schemas.openxmlformats.org/drawingml/2006/main" xmlns:r="http://schemas.openxmlformats.org/officeDocument/2006/relationships">
+  <c:date1904 val="0"/>
+  <c:lang val="en-US"/>
+  <c:roundedCorners val="0"/>
+  <mc:AlternateContent xmlns:mc="http://schemas.openxmlformats.org/markup-compatibility/2006">
+    <mc:Choice xmlns:c14="http://schemas.microsoft.com/office/drawing/2007/8/2/chart" Requires="c14">
+      <c14:style val="102"/>
+    </mc:Choice>
+    <mc:Fallback>
+      <c:style val="2"/>
+    </mc:Fallback>
+  </mc:AlternateContent>
+  <c:chart>
+    <c:title>
+      <c:tx>
+        <c:rich>
+          <a:bodyPr rot="0" spcFirstLastPara="1" vertOverflow="ellipsis" vert="horz" wrap="square" anchor="ctr" anchorCtr="1"/>
+          <a:lstStyle/>
+          <a:p>
+            <a:pPr>
+              <a:defRPr sz="1400" b="0" i="0" u="none" strike="noStrike" kern="1200" cap="none" spc="20" baseline="0">
+                <a:solidFill>
+                  <a:schemeClr val="dk1">
+                    <a:lumMod val="50000"/>
+                    <a:lumOff val="50000"/>
+                  </a:schemeClr>
+                </a:solidFill>
+                <a:latin typeface="+mn-lt"/>
+                <a:ea typeface="+mn-ea"/>
+                <a:cs typeface="+mn-cs"/>
+              </a:defRPr>
+            </a:pPr>
+            <a:r>
+              <a:rPr lang="en-US" sz="2800" dirty="0">
+                <a:latin typeface="Bookman Old Style" panose="02050604050505020204" pitchFamily="18" charset="0"/>
+              </a:rPr>
+              <a:t>Throughput </a:t>
+            </a:r>
+            <a:r>
+              <a:rPr lang="en-US" sz="2800" dirty="0" err="1" smtClean="0">
+                <a:latin typeface="Bookman Old Style" panose="02050604050505020204" pitchFamily="18" charset="0"/>
+              </a:rPr>
+              <a:t>Vs</a:t>
+            </a:r>
+            <a:r>
+              <a:rPr lang="en-US" sz="2800" dirty="0" smtClean="0">
+                <a:latin typeface="Bookman Old Style" panose="02050604050505020204" pitchFamily="18" charset="0"/>
+              </a:rPr>
+              <a:t> Number </a:t>
+            </a:r>
+            <a:r>
+              <a:rPr lang="en-US" sz="2800" dirty="0">
+                <a:latin typeface="Bookman Old Style" panose="02050604050505020204" pitchFamily="18" charset="0"/>
+              </a:rPr>
+              <a:t>of Bolts</a:t>
+            </a:r>
+          </a:p>
+        </c:rich>
+      </c:tx>
+      <c:layout/>
+      <c:overlay val="0"/>
+      <c:spPr>
+        <a:noFill/>
+        <a:ln>
+          <a:noFill/>
+        </a:ln>
+        <a:effectLst/>
+      </c:spPr>
+      <c:txPr>
+        <a:bodyPr rot="0" spcFirstLastPara="1" vertOverflow="ellipsis" vert="horz" wrap="square" anchor="ctr" anchorCtr="1"/>
+        <a:lstStyle/>
+        <a:p>
+          <a:pPr>
+            <a:defRPr sz="1400" b="0" i="0" u="none" strike="noStrike" kern="1200" cap="none" spc="20" baseline="0">
+              <a:solidFill>
+                <a:schemeClr val="dk1">
+                  <a:lumMod val="50000"/>
+                  <a:lumOff val="50000"/>
+                </a:schemeClr>
+              </a:solidFill>
+              <a:latin typeface="+mn-lt"/>
+              <a:ea typeface="+mn-ea"/>
+              <a:cs typeface="+mn-cs"/>
+            </a:defRPr>
+          </a:pPr>
+          <a:endParaRPr lang="en-US"/>
+        </a:p>
+      </c:txPr>
+    </c:title>
+    <c:autoTitleDeleted val="0"/>
+    <c:plotArea>
+      <c:layout/>
+      <c:lineChart>
+        <c:grouping val="standard"/>
+        <c:varyColors val="0"/>
+        <c:ser>
+          <c:idx val="0"/>
+          <c:order val="0"/>
+          <c:spPr>
+            <a:ln w="22225" cap="rnd" cmpd="sng" algn="ctr">
+              <a:solidFill>
+                <a:schemeClr val="accent1"/>
+              </a:solidFill>
+              <a:round/>
+            </a:ln>
+            <a:effectLst/>
+          </c:spPr>
+          <c:marker>
+            <c:symbol val="none"/>
+          </c:marker>
+          <c:cat>
+            <c:numRef>
+              <c:f>Sheet1!$A$1:$A$4</c:f>
+              <c:numCache>
+                <c:formatCode>General</c:formatCode>
+                <c:ptCount val="4"/>
+                <c:pt idx="0">
+                  <c:v>1</c:v>
+                </c:pt>
+                <c:pt idx="1">
+                  <c:v>2</c:v>
+                </c:pt>
+                <c:pt idx="2">
+                  <c:v>4</c:v>
+                </c:pt>
+                <c:pt idx="3">
+                  <c:v>8</c:v>
+                </c:pt>
+              </c:numCache>
+            </c:numRef>
+          </c:cat>
+          <c:val>
+            <c:numRef>
+              <c:f>Sheet1!$B$1:$B$4</c:f>
+              <c:numCache>
+                <c:formatCode>General</c:formatCode>
+                <c:ptCount val="4"/>
+                <c:pt idx="0">
+                  <c:v>4000</c:v>
+                </c:pt>
+                <c:pt idx="1">
+                  <c:v>2166</c:v>
+                </c:pt>
+                <c:pt idx="2">
+                  <c:v>2016</c:v>
+                </c:pt>
+                <c:pt idx="3">
+                  <c:v>2000</c:v>
+                </c:pt>
+              </c:numCache>
+            </c:numRef>
+          </c:val>
+          <c:smooth val="0"/>
+        </c:ser>
+        <c:dLbls>
+          <c:showLegendKey val="0"/>
+          <c:showVal val="0"/>
+          <c:showCatName val="0"/>
+          <c:showSerName val="0"/>
+          <c:showPercent val="0"/>
+          <c:showBubbleSize val="0"/>
+        </c:dLbls>
+        <c:dropLines>
+          <c:spPr>
+            <a:ln w="9525" cap="flat" cmpd="sng" algn="ctr">
+              <a:solidFill>
+                <a:schemeClr val="dk1">
+                  <a:lumMod val="35000"/>
+                  <a:lumOff val="65000"/>
+                  <a:alpha val="33000"/>
+                </a:schemeClr>
+              </a:solidFill>
+              <a:round/>
+            </a:ln>
+            <a:effectLst/>
+          </c:spPr>
+        </c:dropLines>
+        <c:smooth val="0"/>
+        <c:axId val="157227552"/>
+        <c:axId val="215830480"/>
+      </c:lineChart>
+      <c:catAx>
+        <c:axId val="157227552"/>
+        <c:scaling>
+          <c:orientation val="minMax"/>
+        </c:scaling>
+        <c:delete val="0"/>
+        <c:axPos val="b"/>
+        <c:title>
+          <c:tx>
+            <c:rich>
+              <a:bodyPr rot="0" spcFirstLastPara="1" vertOverflow="ellipsis" vert="horz" wrap="square" anchor="ctr" anchorCtr="1"/>
+              <a:lstStyle/>
+              <a:p>
+                <a:pPr>
+                  <a:defRPr sz="900" b="0" i="0" u="none" strike="noStrike" kern="1200" cap="all" baseline="0">
+                    <a:solidFill>
+                      <a:schemeClr val="dk1">
+                        <a:lumMod val="65000"/>
+                        <a:lumOff val="35000"/>
+                      </a:schemeClr>
+                    </a:solidFill>
+                    <a:latin typeface="+mn-lt"/>
+                    <a:ea typeface="+mn-ea"/>
+                    <a:cs typeface="+mn-cs"/>
+                  </a:defRPr>
+                </a:pPr>
+                <a:r>
+                  <a:rPr lang="en-US" sz="2400" dirty="0"/>
+                  <a:t>Bolts</a:t>
+                </a:r>
+              </a:p>
+            </c:rich>
+          </c:tx>
+          <c:layout/>
+          <c:overlay val="0"/>
+          <c:spPr>
+            <a:noFill/>
+            <a:ln>
+              <a:noFill/>
+            </a:ln>
+            <a:effectLst/>
+          </c:spPr>
+          <c:txPr>
+            <a:bodyPr rot="0" spcFirstLastPara="1" vertOverflow="ellipsis" vert="horz" wrap="square" anchor="ctr" anchorCtr="1"/>
+            <a:lstStyle/>
+            <a:p>
+              <a:pPr>
+                <a:defRPr sz="900" b="0" i="0" u="none" strike="noStrike" kern="1200" cap="all" baseline="0">
+                  <a:solidFill>
+                    <a:schemeClr val="dk1">
+                      <a:lumMod val="65000"/>
+                      <a:lumOff val="35000"/>
+                    </a:schemeClr>
+                  </a:solidFill>
+                  <a:latin typeface="+mn-lt"/>
+                  <a:ea typeface="+mn-ea"/>
+                  <a:cs typeface="+mn-cs"/>
+                </a:defRPr>
+              </a:pPr>
+              <a:endParaRPr lang="en-US"/>
+            </a:p>
+          </c:txPr>
+        </c:title>
+        <c:numFmt formatCode="General" sourceLinked="1"/>
+        <c:majorTickMark val="none"/>
+        <c:minorTickMark val="none"/>
+        <c:tickLblPos val="nextTo"/>
+        <c:spPr>
+          <a:noFill/>
+          <a:ln w="9525" cap="flat" cmpd="sng" algn="ctr">
+            <a:solidFill>
+              <a:schemeClr val="dk1">
+                <a:lumMod val="15000"/>
+                <a:lumOff val="85000"/>
+              </a:schemeClr>
+            </a:solidFill>
+            <a:round/>
+          </a:ln>
+          <a:effectLst/>
+        </c:spPr>
+        <c:txPr>
+          <a:bodyPr rot="-60000000" spcFirstLastPara="1" vertOverflow="ellipsis" vert="horz" wrap="square" anchor="ctr" anchorCtr="1"/>
+          <a:lstStyle/>
+          <a:p>
+            <a:pPr>
+              <a:defRPr sz="900" b="0" i="0" u="none" strike="noStrike" kern="1200" spc="20" baseline="0">
+                <a:solidFill>
+                  <a:schemeClr val="dk1">
+                    <a:lumMod val="65000"/>
+                    <a:lumOff val="35000"/>
+                  </a:schemeClr>
+                </a:solidFill>
+                <a:latin typeface="+mn-lt"/>
+                <a:ea typeface="+mn-ea"/>
+                <a:cs typeface="+mn-cs"/>
+              </a:defRPr>
+            </a:pPr>
+            <a:endParaRPr lang="en-US"/>
+          </a:p>
+        </c:txPr>
+        <c:crossAx val="215830480"/>
+        <c:crosses val="autoZero"/>
+        <c:auto val="1"/>
+        <c:lblAlgn val="ctr"/>
+        <c:lblOffset val="100"/>
+        <c:noMultiLvlLbl val="0"/>
+      </c:catAx>
+      <c:valAx>
+        <c:axId val="215830480"/>
+        <c:scaling>
+          <c:orientation val="minMax"/>
+        </c:scaling>
+        <c:delete val="0"/>
+        <c:axPos val="l"/>
+        <c:title>
+          <c:tx>
+            <c:rich>
+              <a:bodyPr rot="-5400000" spcFirstLastPara="1" vertOverflow="ellipsis" vert="horz" wrap="square" anchor="ctr" anchorCtr="1"/>
+              <a:lstStyle/>
+              <a:p>
+                <a:pPr>
+                  <a:defRPr sz="900" b="0" i="0" u="none" strike="noStrike" kern="1200" cap="all" baseline="0">
+                    <a:solidFill>
+                      <a:schemeClr val="dk1">
+                        <a:lumMod val="65000"/>
+                        <a:lumOff val="35000"/>
+                      </a:schemeClr>
+                    </a:solidFill>
+                    <a:latin typeface="+mn-lt"/>
+                    <a:ea typeface="+mn-ea"/>
+                    <a:cs typeface="+mn-cs"/>
+                  </a:defRPr>
+                </a:pPr>
+                <a:r>
+                  <a:rPr lang="en-US" sz="2000" dirty="0"/>
+                  <a:t>Tuples/s</a:t>
+                </a:r>
+              </a:p>
+              <a:p>
+                <a:pPr>
+                  <a:defRPr/>
+                </a:pPr>
+                <a:endParaRPr lang="en-US" dirty="0"/>
+              </a:p>
+            </c:rich>
+          </c:tx>
+          <c:layout/>
+          <c:overlay val="0"/>
+          <c:spPr>
+            <a:noFill/>
+            <a:ln>
+              <a:noFill/>
+            </a:ln>
+            <a:effectLst/>
+          </c:spPr>
+          <c:txPr>
+            <a:bodyPr rot="-5400000" spcFirstLastPara="1" vertOverflow="ellipsis" vert="horz" wrap="square" anchor="ctr" anchorCtr="1"/>
+            <a:lstStyle/>
+            <a:p>
+              <a:pPr>
+                <a:defRPr sz="900" b="0" i="0" u="none" strike="noStrike" kern="1200" cap="all" baseline="0">
+                  <a:solidFill>
+                    <a:schemeClr val="dk1">
+                      <a:lumMod val="65000"/>
+                      <a:lumOff val="35000"/>
+                    </a:schemeClr>
+                  </a:solidFill>
+                  <a:latin typeface="+mn-lt"/>
+                  <a:ea typeface="+mn-ea"/>
+                  <a:cs typeface="+mn-cs"/>
+                </a:defRPr>
+              </a:pPr>
+              <a:endParaRPr lang="en-US"/>
+            </a:p>
+          </c:txPr>
+        </c:title>
+        <c:numFmt formatCode="General" sourceLinked="1"/>
+        <c:majorTickMark val="none"/>
+        <c:minorTickMark val="none"/>
+        <c:tickLblPos val="nextTo"/>
+        <c:spPr>
+          <a:noFill/>
+          <a:ln>
+            <a:noFill/>
+          </a:ln>
+          <a:effectLst/>
+        </c:spPr>
+        <c:txPr>
+          <a:bodyPr rot="-60000000" spcFirstLastPara="1" vertOverflow="ellipsis" vert="horz" wrap="square" anchor="ctr" anchorCtr="1"/>
+          <a:lstStyle/>
+          <a:p>
+            <a:pPr>
+              <a:defRPr sz="900" b="0" i="0" u="none" strike="noStrike" kern="1200" spc="20" baseline="0">
+                <a:solidFill>
+                  <a:schemeClr val="dk1">
+                    <a:lumMod val="65000"/>
+                    <a:lumOff val="35000"/>
+                  </a:schemeClr>
+                </a:solidFill>
+                <a:latin typeface="+mn-lt"/>
+                <a:ea typeface="+mn-ea"/>
+                <a:cs typeface="+mn-cs"/>
+              </a:defRPr>
+            </a:pPr>
+            <a:endParaRPr lang="en-US"/>
+          </a:p>
+        </c:txPr>
+        <c:crossAx val="157227552"/>
+        <c:crosses val="autoZero"/>
+        <c:crossBetween val="between"/>
+        <c:majorUnit val="1000"/>
+      </c:valAx>
+      <c:spPr>
+        <a:gradFill>
+          <a:gsLst>
+            <a:gs pos="100000">
+              <a:schemeClr val="lt1">
+                <a:lumMod val="95000"/>
+              </a:schemeClr>
+            </a:gs>
+            <a:gs pos="0">
+              <a:schemeClr val="lt1"/>
+            </a:gs>
+          </a:gsLst>
+          <a:lin ang="5400000" scaled="0"/>
+        </a:gradFill>
+        <a:ln>
+          <a:noFill/>
+        </a:ln>
+        <a:effectLst/>
+      </c:spPr>
+    </c:plotArea>
+    <c:plotVisOnly val="1"/>
+    <c:dispBlanksAs val="gap"/>
+    <c:showDLblsOverMax val="0"/>
+  </c:chart>
+  <c:spPr>
+    <a:solidFill>
+      <a:schemeClr val="lt1"/>
+    </a:solidFill>
+    <a:ln>
+      <a:noFill/>
+    </a:ln>
+    <a:effectLst/>
+  </c:spPr>
+  <c:txPr>
+    <a:bodyPr/>
+    <a:lstStyle/>
+    <a:p>
+      <a:pPr>
+        <a:defRPr/>
+      </a:pPr>
+      <a:endParaRPr lang="en-US"/>
+    </a:p>
+  </c:txPr>
+  <c:externalData r:id="rId3">
+    <c:autoUpdate val="0"/>
+  </c:externalData>
+</c:chartSpace>
+</file>
+
+<file path=ppt/charts/chart2.xml><?xml version="1.0" encoding="utf-8"?>
+<c:chartSpace xmlns:c="http://schemas.openxmlformats.org/drawingml/2006/chart" xmlns:a="http://schemas.openxmlformats.org/drawingml/2006/main" xmlns:r="http://schemas.openxmlformats.org/officeDocument/2006/relationships">
+  <c:date1904 val="0"/>
+  <c:lang val="en-US"/>
+  <c:roundedCorners val="0"/>
+  <mc:AlternateContent xmlns:mc="http://schemas.openxmlformats.org/markup-compatibility/2006">
+    <mc:Choice xmlns:c14="http://schemas.microsoft.com/office/drawing/2007/8/2/chart" Requires="c14">
+      <c14:style val="102"/>
+    </mc:Choice>
+    <mc:Fallback>
+      <c:style val="2"/>
+    </mc:Fallback>
+  </mc:AlternateContent>
+  <c:chart>
+    <c:title>
+      <c:tx>
+        <c:rich>
+          <a:bodyPr rot="0" spcFirstLastPara="1" vertOverflow="ellipsis" vert="horz" wrap="square" anchor="ctr" anchorCtr="1"/>
+          <a:lstStyle/>
+          <a:p>
+            <a:pPr>
+              <a:defRPr sz="1862" b="0" i="0" u="none" strike="noStrike" kern="1200" spc="0" baseline="0">
+                <a:solidFill>
+                  <a:schemeClr val="tx1">
+                    <a:lumMod val="65000"/>
+                    <a:lumOff val="35000"/>
+                  </a:schemeClr>
+                </a:solidFill>
+                <a:latin typeface="+mn-lt"/>
+                <a:ea typeface="+mn-ea"/>
+                <a:cs typeface="+mn-cs"/>
+              </a:defRPr>
+            </a:pPr>
+            <a:r>
+              <a:rPr lang="en-US" sz="2800" baseline="0" dirty="0">
+                <a:latin typeface="Bookman Old Style" panose="02050604050505020204" pitchFamily="18" charset="0"/>
+              </a:rPr>
+              <a:t>Query Latency </a:t>
+            </a:r>
+            <a:r>
+              <a:rPr lang="en-US" sz="2800" baseline="0" dirty="0" err="1" smtClean="0">
+                <a:latin typeface="Bookman Old Style" panose="02050604050505020204" pitchFamily="18" charset="0"/>
+              </a:rPr>
+              <a:t>Vs</a:t>
+            </a:r>
+            <a:r>
+              <a:rPr lang="en-US" sz="2800" baseline="0" dirty="0" smtClean="0">
+                <a:latin typeface="Bookman Old Style" panose="02050604050505020204" pitchFamily="18" charset="0"/>
+              </a:rPr>
+              <a:t> </a:t>
+            </a:r>
+            <a:r>
+              <a:rPr lang="en-US" sz="2800" baseline="0" dirty="0">
+                <a:latin typeface="Bookman Old Style" panose="02050604050505020204" pitchFamily="18" charset="0"/>
+              </a:rPr>
+              <a:t>State Size</a:t>
+            </a:r>
+          </a:p>
+        </c:rich>
+      </c:tx>
+      <c:layout>
+        <c:manualLayout>
+          <c:xMode val="edge"/>
+          <c:yMode val="edge"/>
+          <c:x val="0.29406746075714651"/>
+          <c:y val="4.1582997839461566E-2"/>
+        </c:manualLayout>
+      </c:layout>
+      <c:overlay val="0"/>
+      <c:spPr>
+        <a:noFill/>
+        <a:ln>
+          <a:noFill/>
+        </a:ln>
+        <a:effectLst/>
+      </c:spPr>
+      <c:txPr>
+        <a:bodyPr rot="0" spcFirstLastPara="1" vertOverflow="ellipsis" vert="horz" wrap="square" anchor="ctr" anchorCtr="1"/>
+        <a:lstStyle/>
+        <a:p>
+          <a:pPr>
+            <a:defRPr sz="1862" b="0" i="0" u="none" strike="noStrike" kern="1200" spc="0" baseline="0">
+              <a:solidFill>
+                <a:schemeClr val="tx1">
+                  <a:lumMod val="65000"/>
+                  <a:lumOff val="35000"/>
+                </a:schemeClr>
+              </a:solidFill>
+              <a:latin typeface="+mn-lt"/>
+              <a:ea typeface="+mn-ea"/>
+              <a:cs typeface="+mn-cs"/>
+            </a:defRPr>
+          </a:pPr>
+          <a:endParaRPr lang="en-US"/>
+        </a:p>
+      </c:txPr>
+    </c:title>
+    <c:autoTitleDeleted val="0"/>
+    <c:plotArea>
+      <c:layout>
+        <c:manualLayout>
+          <c:layoutTarget val="inner"/>
+          <c:xMode val="edge"/>
+          <c:yMode val="edge"/>
+          <c:x val="0.10874878956430499"/>
+          <c:y val="0.19103435017561687"/>
+          <c:w val="0.87925207141901285"/>
+          <c:h val="0.68595559584444432"/>
+        </c:manualLayout>
+      </c:layout>
+      <c:lineChart>
+        <c:grouping val="standard"/>
+        <c:varyColors val="0"/>
+        <c:ser>
+          <c:idx val="0"/>
+          <c:order val="0"/>
+          <c:spPr>
+            <a:ln w="28575" cap="rnd">
+              <a:solidFill>
+                <a:schemeClr val="accent1"/>
+              </a:solidFill>
+              <a:round/>
+            </a:ln>
+            <a:effectLst/>
+          </c:spPr>
+          <c:marker>
+            <c:symbol val="none"/>
+          </c:marker>
+          <c:cat>
+            <c:numRef>
+              <c:f>Sheet1!$D$1:$D$4</c:f>
+              <c:numCache>
+                <c:formatCode>General</c:formatCode>
+                <c:ptCount val="4"/>
+                <c:pt idx="0">
+                  <c:v>10000</c:v>
+                </c:pt>
+                <c:pt idx="1">
+                  <c:v>100000</c:v>
+                </c:pt>
+                <c:pt idx="2">
+                  <c:v>1000000</c:v>
+                </c:pt>
+                <c:pt idx="3">
+                  <c:v>10000000</c:v>
+                </c:pt>
+              </c:numCache>
+            </c:numRef>
+          </c:cat>
+          <c:val>
+            <c:numRef>
+              <c:f>Sheet1!$E$1:$E$4</c:f>
+              <c:numCache>
+                <c:formatCode>General</c:formatCode>
+                <c:ptCount val="4"/>
+                <c:pt idx="0">
+                  <c:v>2906</c:v>
+                </c:pt>
+                <c:pt idx="1">
+                  <c:v>3576</c:v>
+                </c:pt>
+                <c:pt idx="2">
+                  <c:v>4867</c:v>
+                </c:pt>
+                <c:pt idx="3">
+                  <c:v>5040</c:v>
+                </c:pt>
+              </c:numCache>
+            </c:numRef>
+          </c:val>
+          <c:smooth val="1"/>
+        </c:ser>
+        <c:dLbls>
+          <c:dLblPos val="ctr"/>
+          <c:showLegendKey val="0"/>
+          <c:showVal val="0"/>
+          <c:showCatName val="0"/>
+          <c:showSerName val="0"/>
+          <c:showPercent val="0"/>
+          <c:showBubbleSize val="0"/>
+        </c:dLbls>
+        <c:smooth val="0"/>
+        <c:axId val="217434000"/>
+        <c:axId val="217426176"/>
+      </c:lineChart>
+      <c:catAx>
+        <c:axId val="217434000"/>
+        <c:scaling>
+          <c:orientation val="minMax"/>
+        </c:scaling>
+        <c:delete val="0"/>
+        <c:axPos val="b"/>
+        <c:title>
+          <c:tx>
+            <c:rich>
+              <a:bodyPr rot="0" spcFirstLastPara="1" vertOverflow="ellipsis" vert="horz" wrap="square" anchor="ctr" anchorCtr="1"/>
+              <a:lstStyle/>
+              <a:p>
+                <a:pPr>
+                  <a:defRPr sz="1330" b="0" i="0" u="none" strike="noStrike" kern="1200" baseline="0">
+                    <a:solidFill>
+                      <a:schemeClr val="tx1">
+                        <a:lumMod val="65000"/>
+                        <a:lumOff val="35000"/>
+                      </a:schemeClr>
+                    </a:solidFill>
+                    <a:latin typeface="+mn-lt"/>
+                    <a:ea typeface="+mn-ea"/>
+                    <a:cs typeface="+mn-cs"/>
+                  </a:defRPr>
+                </a:pPr>
+                <a:r>
+                  <a:rPr lang="en-US" sz="2000" dirty="0"/>
+                  <a:t>state size (tuples)</a:t>
+                </a:r>
+              </a:p>
+            </c:rich>
+          </c:tx>
+          <c:layout/>
+          <c:overlay val="0"/>
+          <c:spPr>
+            <a:noFill/>
+            <a:ln>
+              <a:noFill/>
+            </a:ln>
+            <a:effectLst/>
+          </c:spPr>
+          <c:txPr>
+            <a:bodyPr rot="0" spcFirstLastPara="1" vertOverflow="ellipsis" vert="horz" wrap="square" anchor="ctr" anchorCtr="1"/>
+            <a:lstStyle/>
+            <a:p>
+              <a:pPr>
+                <a:defRPr sz="1330" b="0" i="0" u="none" strike="noStrike" kern="1200" baseline="0">
+                  <a:solidFill>
+                    <a:schemeClr val="tx1">
+                      <a:lumMod val="65000"/>
+                      <a:lumOff val="35000"/>
+                    </a:schemeClr>
+                  </a:solidFill>
+                  <a:latin typeface="+mn-lt"/>
+                  <a:ea typeface="+mn-ea"/>
+                  <a:cs typeface="+mn-cs"/>
+                </a:defRPr>
+              </a:pPr>
+              <a:endParaRPr lang="en-US"/>
+            </a:p>
+          </c:txPr>
+        </c:title>
+        <c:numFmt formatCode="General" sourceLinked="1"/>
+        <c:majorTickMark val="none"/>
+        <c:minorTickMark val="none"/>
+        <c:tickLblPos val="nextTo"/>
+        <c:spPr>
+          <a:noFill/>
+          <a:ln>
+            <a:noFill/>
+          </a:ln>
+          <a:effectLst/>
+        </c:spPr>
+        <c:txPr>
+          <a:bodyPr rot="-60000000" spcFirstLastPara="1" vertOverflow="ellipsis" vert="horz" wrap="square" anchor="ctr" anchorCtr="1"/>
+          <a:lstStyle/>
+          <a:p>
+            <a:pPr>
+              <a:defRPr sz="1197" b="0" i="0" u="none" strike="noStrike" kern="1200" baseline="0">
+                <a:solidFill>
+                  <a:schemeClr val="tx1">
+                    <a:lumMod val="65000"/>
+                    <a:lumOff val="35000"/>
+                  </a:schemeClr>
+                </a:solidFill>
+                <a:latin typeface="+mn-lt"/>
+                <a:ea typeface="+mn-ea"/>
+                <a:cs typeface="+mn-cs"/>
+              </a:defRPr>
+            </a:pPr>
+            <a:endParaRPr lang="en-US"/>
+          </a:p>
+        </c:txPr>
+        <c:crossAx val="217426176"/>
+        <c:crosses val="autoZero"/>
+        <c:auto val="1"/>
+        <c:lblAlgn val="ctr"/>
+        <c:lblOffset val="100"/>
+        <c:noMultiLvlLbl val="0"/>
+      </c:catAx>
+      <c:valAx>
+        <c:axId val="217426176"/>
+        <c:scaling>
+          <c:orientation val="minMax"/>
+        </c:scaling>
+        <c:delete val="0"/>
+        <c:axPos val="l"/>
+        <c:majorGridlines>
+          <c:spPr>
+            <a:ln w="9525" cap="flat" cmpd="sng" algn="ctr">
+              <a:solidFill>
+                <a:schemeClr val="tx1">
+                  <a:lumMod val="15000"/>
+                  <a:lumOff val="85000"/>
+                </a:schemeClr>
+              </a:solidFill>
+              <a:round/>
+            </a:ln>
+            <a:effectLst/>
+          </c:spPr>
+        </c:majorGridlines>
+        <c:title>
+          <c:tx>
+            <c:rich>
+              <a:bodyPr rot="-5400000" spcFirstLastPara="1" vertOverflow="ellipsis" vert="horz" wrap="square" anchor="ctr" anchorCtr="1"/>
+              <a:lstStyle/>
+              <a:p>
+                <a:pPr>
+                  <a:defRPr sz="1330" b="0" i="0" u="none" strike="noStrike" kern="1200" baseline="0">
+                    <a:solidFill>
+                      <a:schemeClr val="tx1">
+                        <a:lumMod val="65000"/>
+                        <a:lumOff val="35000"/>
+                      </a:schemeClr>
+                    </a:solidFill>
+                    <a:latin typeface="+mn-lt"/>
+                    <a:ea typeface="+mn-ea"/>
+                    <a:cs typeface="+mn-cs"/>
+                  </a:defRPr>
+                </a:pPr>
+                <a:r>
+                  <a:rPr lang="en-US" sz="2000" dirty="0"/>
+                  <a:t>Query Latency</a:t>
+                </a:r>
+              </a:p>
+              <a:p>
+                <a:pPr>
+                  <a:defRPr/>
+                </a:pPr>
+                <a:r>
+                  <a:rPr lang="en-US" sz="2000" dirty="0" err="1"/>
+                  <a:t>ms</a:t>
+                </a:r>
+                <a:endParaRPr lang="en-US" dirty="0"/>
+              </a:p>
+            </c:rich>
+          </c:tx>
+          <c:layout/>
+          <c:overlay val="0"/>
+          <c:spPr>
+            <a:noFill/>
+            <a:ln>
+              <a:noFill/>
+            </a:ln>
+            <a:effectLst/>
+          </c:spPr>
+          <c:txPr>
+            <a:bodyPr rot="-5400000" spcFirstLastPara="1" vertOverflow="ellipsis" vert="horz" wrap="square" anchor="ctr" anchorCtr="1"/>
+            <a:lstStyle/>
+            <a:p>
+              <a:pPr>
+                <a:defRPr sz="1330" b="0" i="0" u="none" strike="noStrike" kern="1200" baseline="0">
+                  <a:solidFill>
+                    <a:schemeClr val="tx1">
+                      <a:lumMod val="65000"/>
+                      <a:lumOff val="35000"/>
+                    </a:schemeClr>
+                  </a:solidFill>
+                  <a:latin typeface="+mn-lt"/>
+                  <a:ea typeface="+mn-ea"/>
+                  <a:cs typeface="+mn-cs"/>
+                </a:defRPr>
+              </a:pPr>
+              <a:endParaRPr lang="en-US"/>
+            </a:p>
+          </c:txPr>
+        </c:title>
+        <c:numFmt formatCode="General" sourceLinked="1"/>
+        <c:majorTickMark val="none"/>
+        <c:minorTickMark val="none"/>
+        <c:tickLblPos val="nextTo"/>
+        <c:spPr>
+          <a:noFill/>
+          <a:ln>
+            <a:noFill/>
+          </a:ln>
+          <a:effectLst/>
+        </c:spPr>
+        <c:txPr>
+          <a:bodyPr rot="-60000000" spcFirstLastPara="1" vertOverflow="ellipsis" vert="horz" wrap="square" anchor="ctr" anchorCtr="1"/>
+          <a:lstStyle/>
+          <a:p>
+            <a:pPr>
+              <a:defRPr sz="1197" b="0" i="0" u="none" strike="noStrike" kern="1200" baseline="0">
+                <a:solidFill>
+                  <a:schemeClr val="tx1">
+                    <a:lumMod val="65000"/>
+                    <a:lumOff val="35000"/>
+                  </a:schemeClr>
+                </a:solidFill>
+                <a:latin typeface="+mn-lt"/>
+                <a:ea typeface="+mn-ea"/>
+                <a:cs typeface="+mn-cs"/>
+              </a:defRPr>
+            </a:pPr>
+            <a:endParaRPr lang="en-US"/>
+          </a:p>
+        </c:txPr>
+        <c:crossAx val="217434000"/>
+        <c:crosses val="autoZero"/>
+        <c:crossBetween val="between"/>
+      </c:valAx>
+      <c:spPr>
+        <a:noFill/>
+        <a:ln>
+          <a:noFill/>
+        </a:ln>
+        <a:effectLst/>
+      </c:spPr>
+    </c:plotArea>
+    <c:plotVisOnly val="1"/>
+    <c:dispBlanksAs val="gap"/>
+    <c:showDLblsOverMax val="0"/>
+  </c:chart>
+  <c:spPr>
+    <a:noFill/>
+    <a:ln>
+      <a:noFill/>
+    </a:ln>
+    <a:effectLst/>
+  </c:spPr>
+  <c:txPr>
+    <a:bodyPr/>
+    <a:lstStyle/>
+    <a:p>
+      <a:pPr>
+        <a:defRPr/>
+      </a:pPr>
+      <a:endParaRPr lang="en-US"/>
+    </a:p>
+  </c:txPr>
+  <c:externalData r:id="rId3">
+    <c:autoUpdate val="0"/>
+  </c:externalData>
+</c:chartSpace>
+</file>
+
+<file path=ppt/charts/chart3.xml><?xml version="1.0" encoding="utf-8"?>
+<c:chartSpace xmlns:c="http://schemas.openxmlformats.org/drawingml/2006/chart" xmlns:a="http://schemas.openxmlformats.org/drawingml/2006/main" xmlns:r="http://schemas.openxmlformats.org/officeDocument/2006/relationships">
+  <c:date1904 val="0"/>
+  <c:lang val="en-US"/>
+  <c:roundedCorners val="0"/>
+  <mc:AlternateContent xmlns:mc="http://schemas.openxmlformats.org/markup-compatibility/2006">
+    <mc:Choice xmlns:c14="http://schemas.microsoft.com/office/drawing/2007/8/2/chart" Requires="c14">
+      <c14:style val="102"/>
+    </mc:Choice>
+    <mc:Fallback>
+      <c:style val="2"/>
+    </mc:Fallback>
+  </mc:AlternateContent>
+  <c:chart>
+    <c:title>
+      <c:tx>
+        <c:rich>
+          <a:bodyPr rot="0" spcFirstLastPara="1" vertOverflow="ellipsis" vert="horz" wrap="square" anchor="ctr" anchorCtr="1"/>
+          <a:lstStyle/>
+          <a:p>
+            <a:pPr>
+              <a:defRPr sz="1862" b="0" i="0" u="none" strike="noStrike" kern="1200" spc="0" baseline="0">
+                <a:solidFill>
+                  <a:schemeClr val="tx1">
+                    <a:lumMod val="65000"/>
+                    <a:lumOff val="35000"/>
+                  </a:schemeClr>
+                </a:solidFill>
+                <a:latin typeface="+mn-lt"/>
+                <a:ea typeface="+mn-ea"/>
+                <a:cs typeface="+mn-cs"/>
+              </a:defRPr>
+            </a:pPr>
+            <a:r>
+              <a:rPr lang="en-US" sz="3200" dirty="0">
+                <a:latin typeface="Bookman Old Style" panose="02050604050505020204" pitchFamily="18" charset="0"/>
+              </a:rPr>
+              <a:t>Throughput </a:t>
+            </a:r>
+            <a:r>
+              <a:rPr lang="en-US" sz="3200" dirty="0" err="1" smtClean="0">
+                <a:latin typeface="Bookman Old Style" panose="02050604050505020204" pitchFamily="18" charset="0"/>
+              </a:rPr>
+              <a:t>Vs</a:t>
+            </a:r>
+            <a:r>
+              <a:rPr lang="en-US" sz="3200" dirty="0" smtClean="0">
+                <a:latin typeface="Bookman Old Style" panose="02050604050505020204" pitchFamily="18" charset="0"/>
+              </a:rPr>
+              <a:t> State-size</a:t>
+            </a:r>
+            <a:endParaRPr lang="en-US" sz="3200" dirty="0">
+              <a:latin typeface="Bookman Old Style" panose="02050604050505020204" pitchFamily="18" charset="0"/>
+            </a:endParaRPr>
+          </a:p>
+        </c:rich>
+      </c:tx>
+      <c:layout>
+        <c:manualLayout>
+          <c:xMode val="edge"/>
+          <c:yMode val="edge"/>
+          <c:x val="0.29170045931758531"/>
+          <c:y val="3.9444447073745587E-2"/>
+        </c:manualLayout>
+      </c:layout>
+      <c:overlay val="0"/>
+      <c:spPr>
+        <a:noFill/>
+        <a:ln>
+          <a:noFill/>
+        </a:ln>
+        <a:effectLst/>
+      </c:spPr>
+      <c:txPr>
+        <a:bodyPr rot="0" spcFirstLastPara="1" vertOverflow="ellipsis" vert="horz" wrap="square" anchor="ctr" anchorCtr="1"/>
+        <a:lstStyle/>
+        <a:p>
+          <a:pPr>
+            <a:defRPr sz="1862" b="0" i="0" u="none" strike="noStrike" kern="1200" spc="0" baseline="0">
+              <a:solidFill>
+                <a:schemeClr val="tx1">
+                  <a:lumMod val="65000"/>
+                  <a:lumOff val="35000"/>
+                </a:schemeClr>
+              </a:solidFill>
+              <a:latin typeface="+mn-lt"/>
+              <a:ea typeface="+mn-ea"/>
+              <a:cs typeface="+mn-cs"/>
+            </a:defRPr>
+          </a:pPr>
+          <a:endParaRPr lang="en-US"/>
+        </a:p>
+      </c:txPr>
+    </c:title>
+    <c:autoTitleDeleted val="0"/>
+    <c:plotArea>
+      <c:layout>
+        <c:manualLayout>
+          <c:layoutTarget val="inner"/>
+          <c:xMode val="edge"/>
+          <c:yMode val="edge"/>
+          <c:x val="6.3576607611548555E-2"/>
+          <c:y val="0.21388296638806592"/>
+          <c:w val="0.89969422572178481"/>
+          <c:h val="0.6847977521841605"/>
+        </c:manualLayout>
+      </c:layout>
+      <c:scatterChart>
+        <c:scatterStyle val="smoothMarker"/>
+        <c:varyColors val="0"/>
+        <c:ser>
+          <c:idx val="0"/>
+          <c:order val="0"/>
+          <c:spPr>
+            <a:ln w="19050" cap="rnd">
+              <a:solidFill>
+                <a:schemeClr val="accent1"/>
+              </a:solidFill>
+              <a:round/>
+            </a:ln>
+            <a:effectLst/>
+          </c:spPr>
+          <c:marker>
+            <c:symbol val="none"/>
+          </c:marker>
+          <c:xVal>
+            <c:numRef>
+              <c:f>Sheet1!$F:$F</c:f>
+              <c:numCache>
+                <c:formatCode>General</c:formatCode>
+                <c:ptCount val="1048576"/>
+                <c:pt idx="0">
+                  <c:v>10000</c:v>
+                </c:pt>
+                <c:pt idx="1">
+                  <c:v>100000</c:v>
+                </c:pt>
+                <c:pt idx="2">
+                  <c:v>1000000</c:v>
+                </c:pt>
+                <c:pt idx="3">
+                  <c:v>10000000</c:v>
+                </c:pt>
+              </c:numCache>
+            </c:numRef>
+          </c:xVal>
+          <c:yVal>
+            <c:numRef>
+              <c:f>Sheet1!$G:$G</c:f>
+              <c:numCache>
+                <c:formatCode>General</c:formatCode>
+                <c:ptCount val="1048576"/>
+                <c:pt idx="0">
+                  <c:v>410</c:v>
+                </c:pt>
+                <c:pt idx="1">
+                  <c:v>496</c:v>
+                </c:pt>
+                <c:pt idx="2">
+                  <c:v>402</c:v>
+                </c:pt>
+                <c:pt idx="3">
+                  <c:v>474</c:v>
+                </c:pt>
+              </c:numCache>
+            </c:numRef>
+          </c:yVal>
+          <c:smooth val="1"/>
+        </c:ser>
+        <c:dLbls>
+          <c:showLegendKey val="0"/>
+          <c:showVal val="0"/>
+          <c:showCatName val="0"/>
+          <c:showSerName val="0"/>
+          <c:showPercent val="0"/>
+          <c:showBubbleSize val="0"/>
+        </c:dLbls>
+        <c:axId val="227223696"/>
+        <c:axId val="227222016"/>
+      </c:scatterChart>
+      <c:valAx>
+        <c:axId val="227223696"/>
+        <c:scaling>
+          <c:orientation val="minMax"/>
+          <c:min val="0"/>
+        </c:scaling>
+        <c:delete val="0"/>
+        <c:axPos val="b"/>
+        <c:majorGridlines>
+          <c:spPr>
+            <a:ln w="9525" cap="flat" cmpd="sng" algn="ctr">
+              <a:solidFill>
+                <a:schemeClr val="tx1">
+                  <a:lumMod val="15000"/>
+                  <a:lumOff val="85000"/>
+                </a:schemeClr>
+              </a:solidFill>
+              <a:round/>
+            </a:ln>
+            <a:effectLst/>
+          </c:spPr>
+        </c:majorGridlines>
+        <c:title>
+          <c:tx>
+            <c:rich>
+              <a:bodyPr rot="0" spcFirstLastPara="1" vertOverflow="ellipsis" vert="horz" wrap="square" anchor="ctr" anchorCtr="1"/>
+              <a:lstStyle/>
+              <a:p>
+                <a:pPr>
+                  <a:defRPr sz="1330" b="0" i="0" u="none" strike="noStrike" kern="1200" baseline="0">
+                    <a:solidFill>
+                      <a:schemeClr val="tx1">
+                        <a:lumMod val="65000"/>
+                        <a:lumOff val="35000"/>
+                      </a:schemeClr>
+                    </a:solidFill>
+                    <a:latin typeface="+mn-lt"/>
+                    <a:ea typeface="+mn-ea"/>
+                    <a:cs typeface="+mn-cs"/>
+                  </a:defRPr>
+                </a:pPr>
+                <a:r>
+                  <a:rPr lang="en-US"/>
+                  <a:t>state size (tuples)</a:t>
+                </a:r>
+              </a:p>
+            </c:rich>
+          </c:tx>
+          <c:layout/>
+          <c:overlay val="0"/>
+          <c:spPr>
+            <a:noFill/>
+            <a:ln>
+              <a:noFill/>
+            </a:ln>
+            <a:effectLst/>
+          </c:spPr>
+          <c:txPr>
+            <a:bodyPr rot="0" spcFirstLastPara="1" vertOverflow="ellipsis" vert="horz" wrap="square" anchor="ctr" anchorCtr="1"/>
+            <a:lstStyle/>
+            <a:p>
+              <a:pPr>
+                <a:defRPr sz="1330" b="0" i="0" u="none" strike="noStrike" kern="1200" baseline="0">
+                  <a:solidFill>
+                    <a:schemeClr val="tx1">
+                      <a:lumMod val="65000"/>
+                      <a:lumOff val="35000"/>
+                    </a:schemeClr>
+                  </a:solidFill>
+                  <a:latin typeface="+mn-lt"/>
+                  <a:ea typeface="+mn-ea"/>
+                  <a:cs typeface="+mn-cs"/>
+                </a:defRPr>
+              </a:pPr>
+              <a:endParaRPr lang="en-US"/>
+            </a:p>
+          </c:txPr>
+        </c:title>
+        <c:numFmt formatCode="General" sourceLinked="1"/>
+        <c:majorTickMark val="none"/>
+        <c:minorTickMark val="none"/>
+        <c:tickLblPos val="nextTo"/>
+        <c:spPr>
+          <a:noFill/>
+          <a:ln w="9525" cap="flat" cmpd="sng" algn="ctr">
+            <a:solidFill>
+              <a:schemeClr val="tx1">
+                <a:lumMod val="25000"/>
+                <a:lumOff val="75000"/>
+              </a:schemeClr>
+            </a:solidFill>
+            <a:round/>
+          </a:ln>
+          <a:effectLst/>
+        </c:spPr>
+        <c:txPr>
+          <a:bodyPr rot="-60000000" spcFirstLastPara="1" vertOverflow="ellipsis" vert="horz" wrap="square" anchor="ctr" anchorCtr="1"/>
+          <a:lstStyle/>
+          <a:p>
+            <a:pPr>
+              <a:defRPr sz="1197" b="0" i="0" u="none" strike="noStrike" kern="1200" baseline="0">
+                <a:solidFill>
+                  <a:schemeClr val="tx1">
+                    <a:lumMod val="65000"/>
+                    <a:lumOff val="35000"/>
+                  </a:schemeClr>
+                </a:solidFill>
+                <a:latin typeface="+mn-lt"/>
+                <a:ea typeface="+mn-ea"/>
+                <a:cs typeface="+mn-cs"/>
+              </a:defRPr>
+            </a:pPr>
+            <a:endParaRPr lang="en-US"/>
+          </a:p>
+        </c:txPr>
+        <c:crossAx val="227222016"/>
+        <c:crosses val="autoZero"/>
+        <c:crossBetween val="midCat"/>
+      </c:valAx>
+      <c:valAx>
+        <c:axId val="227222016"/>
+        <c:scaling>
+          <c:orientation val="minMax"/>
+        </c:scaling>
+        <c:delete val="0"/>
+        <c:axPos val="l"/>
+        <c:majorGridlines>
+          <c:spPr>
+            <a:ln w="9525" cap="flat" cmpd="sng" algn="ctr">
+              <a:solidFill>
+                <a:schemeClr val="tx1">
+                  <a:lumMod val="15000"/>
+                  <a:lumOff val="85000"/>
+                </a:schemeClr>
+              </a:solidFill>
+              <a:round/>
+            </a:ln>
+            <a:effectLst/>
+          </c:spPr>
+        </c:majorGridlines>
+        <c:title>
+          <c:tx>
+            <c:rich>
+              <a:bodyPr rot="-5400000" spcFirstLastPara="1" vertOverflow="ellipsis" vert="horz" wrap="square" anchor="ctr" anchorCtr="1"/>
+              <a:lstStyle/>
+              <a:p>
+                <a:pPr>
+                  <a:defRPr sz="1330" b="0" i="0" u="none" strike="noStrike" kern="1200" baseline="0">
+                    <a:solidFill>
+                      <a:schemeClr val="tx1">
+                        <a:lumMod val="65000"/>
+                        <a:lumOff val="35000"/>
+                      </a:schemeClr>
+                    </a:solidFill>
+                    <a:latin typeface="+mn-lt"/>
+                    <a:ea typeface="+mn-ea"/>
+                    <a:cs typeface="+mn-cs"/>
+                  </a:defRPr>
+                </a:pPr>
+                <a:r>
+                  <a:rPr lang="en-US"/>
+                  <a:t>tuples</a:t>
+                </a:r>
+              </a:p>
+            </c:rich>
+          </c:tx>
+          <c:layout/>
+          <c:overlay val="0"/>
+          <c:spPr>
+            <a:noFill/>
+            <a:ln>
+              <a:noFill/>
+            </a:ln>
+            <a:effectLst/>
+          </c:spPr>
+          <c:txPr>
+            <a:bodyPr rot="-5400000" spcFirstLastPara="1" vertOverflow="ellipsis" vert="horz" wrap="square" anchor="ctr" anchorCtr="1"/>
+            <a:lstStyle/>
+            <a:p>
+              <a:pPr>
+                <a:defRPr sz="1330" b="0" i="0" u="none" strike="noStrike" kern="1200" baseline="0">
+                  <a:solidFill>
+                    <a:schemeClr val="tx1">
+                      <a:lumMod val="65000"/>
+                      <a:lumOff val="35000"/>
+                    </a:schemeClr>
+                  </a:solidFill>
+                  <a:latin typeface="+mn-lt"/>
+                  <a:ea typeface="+mn-ea"/>
+                  <a:cs typeface="+mn-cs"/>
+                </a:defRPr>
+              </a:pPr>
+              <a:endParaRPr lang="en-US"/>
+            </a:p>
+          </c:txPr>
+        </c:title>
+        <c:numFmt formatCode="General" sourceLinked="1"/>
+        <c:majorTickMark val="none"/>
+        <c:minorTickMark val="none"/>
+        <c:tickLblPos val="nextTo"/>
+        <c:spPr>
+          <a:noFill/>
+          <a:ln w="9525" cap="flat" cmpd="sng" algn="ctr">
+            <a:solidFill>
+              <a:schemeClr val="tx1">
+                <a:lumMod val="25000"/>
+                <a:lumOff val="75000"/>
+              </a:schemeClr>
+            </a:solidFill>
+            <a:round/>
+          </a:ln>
+          <a:effectLst/>
+        </c:spPr>
+        <c:txPr>
+          <a:bodyPr rot="-60000000" spcFirstLastPara="1" vertOverflow="ellipsis" vert="horz" wrap="square" anchor="ctr" anchorCtr="1"/>
+          <a:lstStyle/>
+          <a:p>
+            <a:pPr>
+              <a:defRPr sz="1197" b="0" i="0" u="none" strike="noStrike" kern="1200" baseline="0">
+                <a:solidFill>
+                  <a:schemeClr val="tx1">
+                    <a:lumMod val="65000"/>
+                    <a:lumOff val="35000"/>
+                  </a:schemeClr>
+                </a:solidFill>
+                <a:latin typeface="+mn-lt"/>
+                <a:ea typeface="+mn-ea"/>
+                <a:cs typeface="+mn-cs"/>
+              </a:defRPr>
+            </a:pPr>
+            <a:endParaRPr lang="en-US"/>
+          </a:p>
+        </c:txPr>
+        <c:crossAx val="227223696"/>
+        <c:crosses val="autoZero"/>
+        <c:crossBetween val="midCat"/>
+      </c:valAx>
+      <c:spPr>
+        <a:noFill/>
+        <a:ln>
+          <a:noFill/>
+        </a:ln>
+        <a:effectLst/>
+      </c:spPr>
+    </c:plotArea>
+    <c:plotVisOnly val="1"/>
+    <c:dispBlanksAs val="gap"/>
+    <c:showDLblsOverMax val="0"/>
+  </c:chart>
+  <c:spPr>
+    <a:noFill/>
+    <a:ln>
+      <a:noFill/>
+    </a:ln>
+    <a:effectLst/>
+  </c:spPr>
+  <c:txPr>
+    <a:bodyPr/>
+    <a:lstStyle/>
+    <a:p>
+      <a:pPr>
+        <a:defRPr/>
+      </a:pPr>
+      <a:endParaRPr lang="en-US"/>
+    </a:p>
+  </c:txPr>
+  <c:externalData r:id="rId3">
+    <c:autoUpdate val="0"/>
+  </c:externalData>
+</c:chartSpace>
+</file>
+
+<file path=ppt/charts/chart4.xml><?xml version="1.0" encoding="utf-8"?>
+<c:chartSpace xmlns:c="http://schemas.openxmlformats.org/drawingml/2006/chart" xmlns:a="http://schemas.openxmlformats.org/drawingml/2006/main" xmlns:r="http://schemas.openxmlformats.org/officeDocument/2006/relationships">
+  <c:date1904 val="0"/>
+  <c:lang val="en-US"/>
+  <c:roundedCorners val="0"/>
+  <mc:AlternateContent xmlns:mc="http://schemas.openxmlformats.org/markup-compatibility/2006">
+    <mc:Choice xmlns:c14="http://schemas.microsoft.com/office/drawing/2007/8/2/chart" Requires="c14">
+      <c14:style val="102"/>
+    </mc:Choice>
+    <mc:Fallback>
+      <c:style val="2"/>
+    </mc:Fallback>
+  </mc:AlternateContent>
+  <c:chart>
+    <c:title>
+      <c:tx>
+        <c:rich>
+          <a:bodyPr rot="0" spcFirstLastPara="1" vertOverflow="ellipsis" vert="horz" wrap="square" anchor="ctr" anchorCtr="1"/>
+          <a:lstStyle/>
+          <a:p>
+            <a:pPr>
+              <a:defRPr sz="2200" b="1" i="0" u="none" strike="noStrike" kern="1200" baseline="0">
+                <a:solidFill>
+                  <a:schemeClr val="dk1">
+                    <a:lumMod val="75000"/>
+                    <a:lumOff val="25000"/>
+                  </a:schemeClr>
+                </a:solidFill>
+                <a:latin typeface="+mn-lt"/>
+                <a:ea typeface="+mn-ea"/>
+                <a:cs typeface="+mn-cs"/>
+              </a:defRPr>
+            </a:pPr>
+            <a:r>
+              <a:rPr lang="en-US" sz="3200" b="0" dirty="0">
+                <a:latin typeface="Bookman Old Style" panose="02050604050505020204" pitchFamily="18" charset="0"/>
+              </a:rPr>
+              <a:t>Throughput </a:t>
+            </a:r>
+            <a:r>
+              <a:rPr lang="en-US" sz="3200" b="0" dirty="0" err="1">
+                <a:latin typeface="Bookman Old Style" panose="02050604050505020204" pitchFamily="18" charset="0"/>
+              </a:rPr>
+              <a:t>Comparision</a:t>
+            </a:r>
+            <a:r>
+              <a:rPr lang="en-US" sz="3200" b="0" dirty="0">
+                <a:latin typeface="Bookman Old Style" panose="02050604050505020204" pitchFamily="18" charset="0"/>
+              </a:rPr>
+              <a:t>:</a:t>
+            </a:r>
+          </a:p>
+          <a:p>
+            <a:pPr>
+              <a:defRPr/>
+            </a:pPr>
+            <a:r>
+              <a:rPr lang="en-US" sz="3200" b="0" dirty="0">
+                <a:latin typeface="Bookman Old Style" panose="02050604050505020204" pitchFamily="18" charset="0"/>
+              </a:rPr>
+              <a:t>Aggregate() </a:t>
+            </a:r>
+            <a:r>
+              <a:rPr lang="en-US" sz="3200" b="0" dirty="0" err="1">
+                <a:latin typeface="Bookman Old Style" panose="02050604050505020204" pitchFamily="18" charset="0"/>
+              </a:rPr>
+              <a:t>Vs</a:t>
+            </a:r>
+            <a:r>
+              <a:rPr lang="en-US" sz="3200" b="0" dirty="0">
+                <a:latin typeface="Bookman Old Style" panose="02050604050505020204" pitchFamily="18" charset="0"/>
+              </a:rPr>
+              <a:t> </a:t>
+            </a:r>
+            <a:r>
+              <a:rPr lang="en-US" sz="3200" b="0" dirty="0" err="1">
+                <a:latin typeface="Bookman Old Style" panose="02050604050505020204" pitchFamily="18" charset="0"/>
+              </a:rPr>
+              <a:t>partitionPersist</a:t>
+            </a:r>
+            <a:r>
+              <a:rPr lang="en-US" sz="3200" b="0" dirty="0">
+                <a:latin typeface="Bookman Old Style" panose="02050604050505020204" pitchFamily="18" charset="0"/>
+              </a:rPr>
+              <a:t>()  </a:t>
+            </a:r>
+          </a:p>
+        </c:rich>
+      </c:tx>
+      <c:layout>
+        <c:manualLayout>
+          <c:xMode val="edge"/>
+          <c:yMode val="edge"/>
+          <c:x val="0.2246079893872458"/>
+          <c:y val="2.4074074074074074E-2"/>
+        </c:manualLayout>
+      </c:layout>
+      <c:overlay val="0"/>
+      <c:spPr>
+        <a:noFill/>
+        <a:ln>
+          <a:noFill/>
+        </a:ln>
+        <a:effectLst/>
+      </c:spPr>
+      <c:txPr>
+        <a:bodyPr rot="0" spcFirstLastPara="1" vertOverflow="ellipsis" vert="horz" wrap="square" anchor="ctr" anchorCtr="1"/>
+        <a:lstStyle/>
+        <a:p>
+          <a:pPr>
+            <a:defRPr sz="2200" b="1" i="0" u="none" strike="noStrike" kern="1200" baseline="0">
+              <a:solidFill>
+                <a:schemeClr val="dk1">
+                  <a:lumMod val="75000"/>
+                  <a:lumOff val="25000"/>
+                </a:schemeClr>
+              </a:solidFill>
+              <a:latin typeface="+mn-lt"/>
+              <a:ea typeface="+mn-ea"/>
+              <a:cs typeface="+mn-cs"/>
+            </a:defRPr>
+          </a:pPr>
+          <a:endParaRPr lang="en-US"/>
+        </a:p>
+      </c:txPr>
+    </c:title>
+    <c:autoTitleDeleted val="0"/>
+    <c:plotArea>
+      <c:layout/>
+      <c:barChart>
+        <c:barDir val="bar"/>
+        <c:grouping val="clustered"/>
+        <c:varyColors val="0"/>
+        <c:ser>
+          <c:idx val="0"/>
+          <c:order val="0"/>
+          <c:tx>
+            <c:v>DRPC state Query</c:v>
+          </c:tx>
+          <c:spPr>
+            <a:solidFill>
+              <a:schemeClr val="accent1">
+                <a:alpha val="85000"/>
+              </a:schemeClr>
+            </a:solidFill>
+            <a:ln w="9525" cap="flat" cmpd="sng" algn="ctr">
+              <a:solidFill>
+                <a:schemeClr val="lt1">
+                  <a:alpha val="50000"/>
+                </a:schemeClr>
+              </a:solidFill>
+              <a:round/>
+            </a:ln>
+            <a:effectLst/>
+          </c:spPr>
+          <c:invertIfNegative val="0"/>
+          <c:dLbls>
+            <c:spPr>
+              <a:noFill/>
+              <a:ln>
+                <a:noFill/>
+              </a:ln>
+              <a:effectLst/>
+            </c:spPr>
+            <c:txPr>
+              <a:bodyPr rot="0" spcFirstLastPara="1" vertOverflow="ellipsis" vert="horz" wrap="square" lIns="38100" tIns="19050" rIns="38100" bIns="19050" anchor="ctr" anchorCtr="1">
+                <a:spAutoFit/>
+              </a:bodyPr>
+              <a:lstStyle/>
+              <a:p>
+                <a:pPr>
+                  <a:defRPr sz="1197" b="1" i="0" u="none" strike="noStrike" kern="1200" baseline="0">
+                    <a:solidFill>
+                      <a:schemeClr val="lt1"/>
+                    </a:solidFill>
+                    <a:latin typeface="+mn-lt"/>
+                    <a:ea typeface="+mn-ea"/>
+                    <a:cs typeface="+mn-cs"/>
+                  </a:defRPr>
+                </a:pPr>
+                <a:endParaRPr lang="en-US"/>
+              </a:p>
+            </c:txPr>
+            <c:dLblPos val="inEnd"/>
+            <c:showLegendKey val="0"/>
+            <c:showVal val="1"/>
+            <c:showCatName val="0"/>
+            <c:showSerName val="0"/>
+            <c:showPercent val="0"/>
+            <c:showBubbleSize val="0"/>
+            <c:showLeaderLines val="0"/>
+            <c:extLst>
+              <c:ext xmlns:c15="http://schemas.microsoft.com/office/drawing/2012/chart" uri="{CE6537A1-D6FC-4f65-9D91-7224C49458BB}">
+                <c15:layout/>
+                <c15:showLeaderLines val="1"/>
+                <c15:leaderLines>
+                  <c:spPr>
+                    <a:ln w="9525">
+                      <a:solidFill>
+                        <a:schemeClr val="dk1">
+                          <a:lumMod val="50000"/>
+                          <a:lumOff val="50000"/>
+                        </a:schemeClr>
+                      </a:solidFill>
+                    </a:ln>
+                    <a:effectLst/>
+                  </c:spPr>
+                </c15:leaderLines>
+              </c:ext>
+            </c:extLst>
+          </c:dLbls>
+          <c:val>
+            <c:numRef>
+              <c:f>Sheet1!$J$1</c:f>
+              <c:numCache>
+                <c:formatCode>General</c:formatCode>
+                <c:ptCount val="1"/>
+                <c:pt idx="0">
+                  <c:v>250</c:v>
+                </c:pt>
+              </c:numCache>
+            </c:numRef>
+          </c:val>
+        </c:ser>
+        <c:ser>
+          <c:idx val="1"/>
+          <c:order val="1"/>
+          <c:tx>
+            <c:v>Aggregation</c:v>
+          </c:tx>
+          <c:spPr>
+            <a:solidFill>
+              <a:schemeClr val="accent2">
+                <a:alpha val="85000"/>
+              </a:schemeClr>
+            </a:solidFill>
+            <a:ln w="9525" cap="flat" cmpd="sng" algn="ctr">
+              <a:solidFill>
+                <a:schemeClr val="lt1">
+                  <a:alpha val="50000"/>
+                </a:schemeClr>
+              </a:solidFill>
+              <a:round/>
+            </a:ln>
+            <a:effectLst/>
+          </c:spPr>
+          <c:invertIfNegative val="0"/>
+          <c:dLbls>
+            <c:spPr>
+              <a:noFill/>
+              <a:ln>
+                <a:noFill/>
+              </a:ln>
+              <a:effectLst/>
+            </c:spPr>
+            <c:txPr>
+              <a:bodyPr rot="0" spcFirstLastPara="1" vertOverflow="ellipsis" vert="horz" wrap="square" lIns="38100" tIns="19050" rIns="38100" bIns="19050" anchor="ctr" anchorCtr="1">
+                <a:spAutoFit/>
+              </a:bodyPr>
+              <a:lstStyle/>
+              <a:p>
+                <a:pPr>
+                  <a:defRPr sz="1197" b="1" i="0" u="none" strike="noStrike" kern="1200" baseline="0">
+                    <a:solidFill>
+                      <a:schemeClr val="lt1"/>
+                    </a:solidFill>
+                    <a:latin typeface="+mn-lt"/>
+                    <a:ea typeface="+mn-ea"/>
+                    <a:cs typeface="+mn-cs"/>
+                  </a:defRPr>
+                </a:pPr>
+                <a:endParaRPr lang="en-US"/>
+              </a:p>
+            </c:txPr>
+            <c:dLblPos val="inEnd"/>
+            <c:showLegendKey val="0"/>
+            <c:showVal val="1"/>
+            <c:showCatName val="0"/>
+            <c:showSerName val="0"/>
+            <c:showPercent val="0"/>
+            <c:showBubbleSize val="0"/>
+            <c:showLeaderLines val="0"/>
+            <c:extLst>
+              <c:ext xmlns:c15="http://schemas.microsoft.com/office/drawing/2012/chart" uri="{CE6537A1-D6FC-4f65-9D91-7224C49458BB}">
+                <c15:layout/>
+                <c15:showLeaderLines val="1"/>
+                <c15:leaderLines>
+                  <c:spPr>
+                    <a:ln w="9525">
+                      <a:solidFill>
+                        <a:schemeClr val="dk1">
+                          <a:lumMod val="50000"/>
+                          <a:lumOff val="50000"/>
+                        </a:schemeClr>
+                      </a:solidFill>
+                    </a:ln>
+                    <a:effectLst/>
+                  </c:spPr>
+                </c15:leaderLines>
+              </c:ext>
+            </c:extLst>
+          </c:dLbls>
+          <c:val>
+            <c:numRef>
+              <c:f>Sheet1!$K$1</c:f>
+              <c:numCache>
+                <c:formatCode>General</c:formatCode>
+                <c:ptCount val="1"/>
+                <c:pt idx="0">
+                  <c:v>4000</c:v>
+                </c:pt>
+              </c:numCache>
+            </c:numRef>
+          </c:val>
+        </c:ser>
+        <c:dLbls>
+          <c:dLblPos val="inEnd"/>
+          <c:showLegendKey val="0"/>
+          <c:showVal val="1"/>
+          <c:showCatName val="0"/>
+          <c:showSerName val="0"/>
+          <c:showPercent val="0"/>
+          <c:showBubbleSize val="0"/>
+        </c:dLbls>
+        <c:gapWidth val="65"/>
+        <c:axId val="224092192"/>
+        <c:axId val="224089952"/>
+      </c:barChart>
+      <c:catAx>
+        <c:axId val="224092192"/>
+        <c:scaling>
+          <c:orientation val="minMax"/>
+        </c:scaling>
+        <c:delete val="0"/>
+        <c:axPos val="l"/>
+        <c:title>
+          <c:tx>
+            <c:rich>
+              <a:bodyPr rot="-5400000" spcFirstLastPara="1" vertOverflow="ellipsis" vert="horz" wrap="square" anchor="ctr" anchorCtr="1"/>
+              <a:lstStyle/>
+              <a:p>
+                <a:pPr>
+                  <a:defRPr sz="1197" b="1" i="0" u="none" strike="noStrike" kern="1200" baseline="0">
+                    <a:solidFill>
+                      <a:schemeClr val="dk1">
+                        <a:lumMod val="75000"/>
+                        <a:lumOff val="25000"/>
+                      </a:schemeClr>
+                    </a:solidFill>
+                    <a:latin typeface="+mn-lt"/>
+                    <a:ea typeface="+mn-ea"/>
+                    <a:cs typeface="+mn-cs"/>
+                  </a:defRPr>
+                </a:pPr>
+                <a:r>
+                  <a:rPr lang="en-US"/>
+                  <a:t>Drpc State Queries are Expensive</a:t>
+                </a:r>
+              </a:p>
+              <a:p>
+                <a:pPr>
+                  <a:defRPr/>
+                </a:pPr>
+                <a:endParaRPr lang="en-US"/>
+              </a:p>
+            </c:rich>
+          </c:tx>
+          <c:layout/>
+          <c:overlay val="0"/>
+          <c:spPr>
+            <a:noFill/>
+            <a:ln>
+              <a:noFill/>
+            </a:ln>
+            <a:effectLst/>
+          </c:spPr>
+          <c:txPr>
+            <a:bodyPr rot="-5400000" spcFirstLastPara="1" vertOverflow="ellipsis" vert="horz" wrap="square" anchor="ctr" anchorCtr="1"/>
+            <a:lstStyle/>
+            <a:p>
+              <a:pPr>
+                <a:defRPr sz="1197" b="1" i="0" u="none" strike="noStrike" kern="1200" baseline="0">
+                  <a:solidFill>
+                    <a:schemeClr val="dk1">
+                      <a:lumMod val="75000"/>
+                      <a:lumOff val="25000"/>
+                    </a:schemeClr>
+                  </a:solidFill>
+                  <a:latin typeface="+mn-lt"/>
+                  <a:ea typeface="+mn-ea"/>
+                  <a:cs typeface="+mn-cs"/>
+                </a:defRPr>
+              </a:pPr>
+              <a:endParaRPr lang="en-US"/>
+            </a:p>
+          </c:txPr>
+        </c:title>
+        <c:numFmt formatCode="@" sourceLinked="0"/>
+        <c:majorTickMark val="none"/>
+        <c:minorTickMark val="none"/>
+        <c:tickLblPos val="nextTo"/>
+        <c:spPr>
+          <a:noFill/>
+          <a:ln w="19050" cap="flat" cmpd="sng" algn="ctr">
+            <a:solidFill>
+              <a:schemeClr val="dk1">
+                <a:lumMod val="75000"/>
+                <a:lumOff val="25000"/>
+              </a:schemeClr>
+            </a:solidFill>
+            <a:round/>
+          </a:ln>
+          <a:effectLst/>
+        </c:spPr>
+        <c:txPr>
+          <a:bodyPr rot="-60000000" spcFirstLastPara="1" vertOverflow="ellipsis" vert="horz" wrap="square" anchor="ctr" anchorCtr="1"/>
+          <a:lstStyle/>
+          <a:p>
+            <a:pPr>
+              <a:defRPr sz="1197" b="0" i="0" u="none" strike="noStrike" kern="1200" cap="all" baseline="0">
+                <a:solidFill>
+                  <a:schemeClr val="dk1">
+                    <a:lumMod val="75000"/>
+                    <a:lumOff val="25000"/>
+                  </a:schemeClr>
+                </a:solidFill>
+                <a:latin typeface="+mn-lt"/>
+                <a:ea typeface="+mn-ea"/>
+                <a:cs typeface="+mn-cs"/>
+              </a:defRPr>
+            </a:pPr>
+            <a:endParaRPr lang="en-US"/>
+          </a:p>
+        </c:txPr>
+        <c:crossAx val="224089952"/>
+        <c:crosses val="autoZero"/>
+        <c:auto val="0"/>
+        <c:lblAlgn val="ctr"/>
+        <c:lblOffset val="100"/>
+        <c:noMultiLvlLbl val="0"/>
+      </c:catAx>
+      <c:valAx>
+        <c:axId val="224089952"/>
+        <c:scaling>
+          <c:orientation val="minMax"/>
+        </c:scaling>
+        <c:delete val="0"/>
+        <c:axPos val="b"/>
+        <c:majorGridlines>
+          <c:spPr>
+            <a:ln w="9525" cap="flat" cmpd="sng" algn="ctr">
+              <a:gradFill>
+                <a:gsLst>
+                  <a:gs pos="100000">
+                    <a:schemeClr val="dk1">
+                      <a:lumMod val="95000"/>
+                      <a:lumOff val="5000"/>
+                      <a:alpha val="42000"/>
+                    </a:schemeClr>
+                  </a:gs>
+                  <a:gs pos="0">
+                    <a:schemeClr val="lt1">
+                      <a:lumMod val="75000"/>
+                      <a:alpha val="36000"/>
+                    </a:schemeClr>
+                  </a:gs>
+                </a:gsLst>
+                <a:lin ang="5400000" scaled="0"/>
+              </a:gradFill>
+              <a:round/>
+            </a:ln>
+            <a:effectLst/>
+          </c:spPr>
+        </c:majorGridlines>
+        <c:title>
+          <c:tx>
+            <c:rich>
+              <a:bodyPr rot="0" spcFirstLastPara="1" vertOverflow="ellipsis" vert="horz" wrap="square" anchor="ctr" anchorCtr="1"/>
+              <a:lstStyle/>
+              <a:p>
+                <a:pPr>
+                  <a:defRPr sz="1197" b="1" i="0" u="none" strike="noStrike" kern="1200" baseline="0">
+                    <a:solidFill>
+                      <a:schemeClr val="dk1">
+                        <a:lumMod val="75000"/>
+                        <a:lumOff val="25000"/>
+                      </a:schemeClr>
+                    </a:solidFill>
+                    <a:latin typeface="+mn-lt"/>
+                    <a:ea typeface="+mn-ea"/>
+                    <a:cs typeface="+mn-cs"/>
+                  </a:defRPr>
+                </a:pPr>
+                <a:r>
+                  <a:rPr lang="en-US"/>
+                  <a:t>tuples</a:t>
+                </a:r>
+              </a:p>
+              <a:p>
+                <a:pPr>
+                  <a:defRPr/>
+                </a:pPr>
+                <a:endParaRPr lang="en-US"/>
+              </a:p>
+            </c:rich>
+          </c:tx>
+          <c:layout/>
+          <c:overlay val="0"/>
+          <c:spPr>
+            <a:noFill/>
+            <a:ln>
+              <a:noFill/>
+            </a:ln>
+            <a:effectLst/>
+          </c:spPr>
+          <c:txPr>
+            <a:bodyPr rot="0" spcFirstLastPara="1" vertOverflow="ellipsis" vert="horz" wrap="square" anchor="ctr" anchorCtr="1"/>
+            <a:lstStyle/>
+            <a:p>
+              <a:pPr>
+                <a:defRPr sz="1197" b="1" i="0" u="none" strike="noStrike" kern="1200" baseline="0">
+                  <a:solidFill>
+                    <a:schemeClr val="dk1">
+                      <a:lumMod val="75000"/>
+                      <a:lumOff val="25000"/>
+                    </a:schemeClr>
+                  </a:solidFill>
+                  <a:latin typeface="+mn-lt"/>
+                  <a:ea typeface="+mn-ea"/>
+                  <a:cs typeface="+mn-cs"/>
+                </a:defRPr>
+              </a:pPr>
+              <a:endParaRPr lang="en-US"/>
+            </a:p>
+          </c:txPr>
+        </c:title>
+        <c:numFmt formatCode="General" sourceLinked="1"/>
+        <c:majorTickMark val="none"/>
+        <c:minorTickMark val="none"/>
+        <c:tickLblPos val="nextTo"/>
+        <c:spPr>
+          <a:noFill/>
+          <a:ln>
+            <a:noFill/>
+          </a:ln>
+          <a:effectLst/>
+        </c:spPr>
+        <c:txPr>
+          <a:bodyPr rot="-60000000" spcFirstLastPara="1" vertOverflow="ellipsis" vert="horz" wrap="square" anchor="ctr" anchorCtr="1"/>
+          <a:lstStyle/>
+          <a:p>
+            <a:pPr>
+              <a:defRPr sz="1197" b="0" i="0" u="none" strike="noStrike" kern="1200" baseline="0">
+                <a:solidFill>
+                  <a:schemeClr val="dk1">
+                    <a:lumMod val="75000"/>
+                    <a:lumOff val="25000"/>
+                  </a:schemeClr>
+                </a:solidFill>
+                <a:latin typeface="+mn-lt"/>
+                <a:ea typeface="+mn-ea"/>
+                <a:cs typeface="+mn-cs"/>
+              </a:defRPr>
+            </a:pPr>
+            <a:endParaRPr lang="en-US"/>
+          </a:p>
+        </c:txPr>
+        <c:crossAx val="224092192"/>
+        <c:crosses val="autoZero"/>
+        <c:crossBetween val="between"/>
+      </c:valAx>
+      <c:spPr>
+        <a:noFill/>
+        <a:ln>
+          <a:noFill/>
+        </a:ln>
+        <a:effectLst/>
+      </c:spPr>
+    </c:plotArea>
+    <c:legend>
+      <c:legendPos val="b"/>
+      <c:layout/>
+      <c:overlay val="0"/>
+      <c:spPr>
+        <a:solidFill>
+          <a:schemeClr val="lt1">
+            <a:lumMod val="95000"/>
+            <a:alpha val="39000"/>
+          </a:schemeClr>
+        </a:solidFill>
+        <a:ln>
+          <a:noFill/>
+        </a:ln>
+        <a:effectLst/>
+      </c:spPr>
+      <c:txPr>
+        <a:bodyPr rot="0" spcFirstLastPara="1" vertOverflow="ellipsis" vert="horz" wrap="square" anchor="ctr" anchorCtr="1"/>
+        <a:lstStyle/>
+        <a:p>
+          <a:pPr>
+            <a:defRPr sz="1197" b="0" i="0" u="none" strike="noStrike" kern="1200" baseline="0">
+              <a:solidFill>
+                <a:schemeClr val="dk1">
+                  <a:lumMod val="75000"/>
+                  <a:lumOff val="25000"/>
+                </a:schemeClr>
+              </a:solidFill>
+              <a:latin typeface="+mn-lt"/>
+              <a:ea typeface="+mn-ea"/>
+              <a:cs typeface="+mn-cs"/>
+            </a:defRPr>
+          </a:pPr>
+          <a:endParaRPr lang="en-US"/>
+        </a:p>
+      </c:txPr>
+    </c:legend>
+    <c:plotVisOnly val="1"/>
+    <c:dispBlanksAs val="gap"/>
+    <c:showDLblsOverMax val="0"/>
+  </c:chart>
+  <c:spPr>
+    <a:gradFill flip="none" rotWithShape="1">
+      <a:gsLst>
+        <a:gs pos="0">
+          <a:schemeClr val="lt1"/>
+        </a:gs>
+        <a:gs pos="39000">
+          <a:schemeClr val="lt1"/>
+        </a:gs>
+        <a:gs pos="100000">
+          <a:schemeClr val="lt1">
+            <a:lumMod val="75000"/>
+          </a:schemeClr>
+        </a:gs>
+      </a:gsLst>
+      <a:path path="circle">
+        <a:fillToRect l="50000" t="-80000" r="50000" b="180000"/>
+      </a:path>
+      <a:tileRect/>
+    </a:gradFill>
+    <a:ln w="9525" cap="flat" cmpd="sng" algn="ctr">
+      <a:solidFill>
+        <a:schemeClr val="dk1">
+          <a:lumMod val="25000"/>
+          <a:lumOff val="75000"/>
+        </a:schemeClr>
+      </a:solidFill>
+      <a:round/>
+    </a:ln>
+    <a:effectLst/>
+  </c:spPr>
+  <c:txPr>
+    <a:bodyPr/>
+    <a:lstStyle/>
+    <a:p>
+      <a:pPr>
+        <a:defRPr/>
+      </a:pPr>
+      <a:endParaRPr lang="en-US"/>
+    </a:p>
+  </c:txPr>
+  <c:externalData r:id="rId3">
+    <c:autoUpdate val="0"/>
+  </c:externalData>
+</c:chartSpace>
+</file>
+
+<file path=ppt/charts/colors1.xml><?xml version="1.0" encoding="utf-8"?>
+<cs:colorStyle xmlns:cs="http://schemas.microsoft.com/office/drawing/2012/chartStyle" xmlns:a="http://schemas.openxmlformats.org/drawingml/2006/main" meth="cycle" id="10">
+  <a:schemeClr val="accent1"/>
+  <a:schemeClr val="accent2"/>
+  <a:schemeClr val="accent3"/>
+  <a:schemeClr val="accent4"/>
+  <a:schemeClr val="accent5"/>
+  <a:schemeClr val="accent6"/>
+  <cs:variation/>
+  <cs:variation>
+    <a:lumMod val="60000"/>
+  </cs:variation>
+  <cs:variation>
+    <a:lumMod val="80000"/>
+    <a:lumOff val="20000"/>
+  </cs:variation>
+  <cs:variation>
+    <a:lumMod val="80000"/>
+  </cs:variation>
+  <cs:variation>
+    <a:lumMod val="60000"/>
+    <a:lumOff val="40000"/>
+  </cs:variation>
+  <cs:variation>
+    <a:lumMod val="50000"/>
+  </cs:variation>
+  <cs:variation>
+    <a:lumMod val="70000"/>
+    <a:lumOff val="30000"/>
+  </cs:variation>
+  <cs:variation>
+    <a:lumMod val="70000"/>
+  </cs:variation>
+  <cs:variation>
+    <a:lumMod val="50000"/>
+    <a:lumOff val="50000"/>
+  </cs:variation>
+</cs:colorStyle>
+</file>
+
+<file path=ppt/charts/colors2.xml><?xml version="1.0" encoding="utf-8"?>
+<cs:colorStyle xmlns:cs="http://schemas.microsoft.com/office/drawing/2012/chartStyle" xmlns:a="http://schemas.openxmlformats.org/drawingml/2006/main" meth="cycle" id="10">
+  <a:schemeClr val="accent1"/>
+  <a:schemeClr val="accent2"/>
+  <a:schemeClr val="accent3"/>
+  <a:schemeClr val="accent4"/>
+  <a:schemeClr val="accent5"/>
+  <a:schemeClr val="accent6"/>
+  <cs:variation/>
+  <cs:variation>
+    <a:lumMod val="60000"/>
+  </cs:variation>
+  <cs:variation>
+    <a:lumMod val="80000"/>
+    <a:lumOff val="20000"/>
+  </cs:variation>
+  <cs:variation>
+    <a:lumMod val="80000"/>
+  </cs:variation>
+  <cs:variation>
+    <a:lumMod val="60000"/>
+    <a:lumOff val="40000"/>
+  </cs:variation>
+  <cs:variation>
+    <a:lumMod val="50000"/>
+  </cs:variation>
+  <cs:variation>
+    <a:lumMod val="70000"/>
+    <a:lumOff val="30000"/>
+  </cs:variation>
+  <cs:variation>
+    <a:lumMod val="70000"/>
+  </cs:variation>
+  <cs:variation>
+    <a:lumMod val="50000"/>
+    <a:lumOff val="50000"/>
+  </cs:variation>
+</cs:colorStyle>
+</file>
+
+<file path=ppt/charts/colors3.xml><?xml version="1.0" encoding="utf-8"?>
+<cs:colorStyle xmlns:cs="http://schemas.microsoft.com/office/drawing/2012/chartStyle" xmlns:a="http://schemas.openxmlformats.org/drawingml/2006/main" meth="cycle" id="10">
+  <a:schemeClr val="accent1"/>
+  <a:schemeClr val="accent2"/>
+  <a:schemeClr val="accent3"/>
+  <a:schemeClr val="accent4"/>
+  <a:schemeClr val="accent5"/>
+  <a:schemeClr val="accent6"/>
+  <cs:variation/>
+  <cs:variation>
+    <a:lumMod val="60000"/>
+  </cs:variation>
+  <cs:variation>
+    <a:lumMod val="80000"/>
+    <a:lumOff val="20000"/>
+  </cs:variation>
+  <cs:variation>
+    <a:lumMod val="80000"/>
+  </cs:variation>
+  <cs:variation>
+    <a:lumMod val="60000"/>
+    <a:lumOff val="40000"/>
+  </cs:variation>
+  <cs:variation>
+    <a:lumMod val="50000"/>
+  </cs:variation>
+  <cs:variation>
+    <a:lumMod val="70000"/>
+    <a:lumOff val="30000"/>
+  </cs:variation>
+  <cs:variation>
+    <a:lumMod val="70000"/>
+  </cs:variation>
+  <cs:variation>
+    <a:lumMod val="50000"/>
+    <a:lumOff val="50000"/>
+  </cs:variation>
+</cs:colorStyle>
+</file>
+
+<file path=ppt/charts/colors4.xml><?xml version="1.0" encoding="utf-8"?>
+<cs:colorStyle xmlns:cs="http://schemas.microsoft.com/office/drawing/2012/chartStyle" xmlns:a="http://schemas.openxmlformats.org/drawingml/2006/main" meth="cycle" id="10">
+  <a:schemeClr val="accent1"/>
+  <a:schemeClr val="accent2"/>
+  <a:schemeClr val="accent3"/>
+  <a:schemeClr val="accent4"/>
+  <a:schemeClr val="accent5"/>
+  <a:schemeClr val="accent6"/>
+  <cs:variation/>
+  <cs:variation>
+    <a:lumMod val="60000"/>
+  </cs:variation>
+  <cs:variation>
+    <a:lumMod val="80000"/>
+    <a:lumOff val="20000"/>
+  </cs:variation>
+  <cs:variation>
+    <a:lumMod val="80000"/>
+  </cs:variation>
+  <cs:variation>
+    <a:lumMod val="60000"/>
+    <a:lumOff val="40000"/>
+  </cs:variation>
+  <cs:variation>
+    <a:lumMod val="50000"/>
+  </cs:variation>
+  <cs:variation>
+    <a:lumMod val="70000"/>
+    <a:lumOff val="30000"/>
+  </cs:variation>
+  <cs:variation>
+    <a:lumMod val="70000"/>
+  </cs:variation>
+  <cs:variation>
+    <a:lumMod val="50000"/>
+    <a:lumOff val="50000"/>
+  </cs:variation>
+</cs:colorStyle>
+</file>
+
+<file path=ppt/charts/style1.xml><?xml version="1.0" encoding="utf-8"?>
+<cs:chartStyle xmlns:cs="http://schemas.microsoft.com/office/drawing/2012/chartStyle" xmlns:a="http://schemas.openxmlformats.org/drawingml/2006/main" id="230">
+  <cs:axisTitle>
+    <cs:lnRef idx="0"/>
+    <cs:fillRef idx="0"/>
+    <cs:effectRef idx="0"/>
+    <cs:fontRef idx="minor">
+      <a:schemeClr val="dk1">
+        <a:lumMod val="65000"/>
+        <a:lumOff val="35000"/>
+      </a:schemeClr>
+    </cs:fontRef>
+    <cs:defRPr sz="900" kern="1200" cap="all"/>
+  </cs:axisTitle>
+  <cs:categoryAxis>
+    <cs:lnRef idx="0"/>
+    <cs:fillRef idx="0"/>
+    <cs:effectRef idx="0"/>
+    <cs:fontRef idx="minor">
+      <a:schemeClr val="dk1">
+        <a:lumMod val="65000"/>
+        <a:lumOff val="35000"/>
+      </a:schemeClr>
+    </cs:fontRef>
+    <cs:spPr>
+      <a:ln w="9525" cap="flat" cmpd="sng" algn="ctr">
+        <a:solidFill>
+          <a:schemeClr val="dk1">
+            <a:lumMod val="15000"/>
+            <a:lumOff val="85000"/>
+          </a:schemeClr>
+        </a:solidFill>
+        <a:round/>
+      </a:ln>
+    </cs:spPr>
+    <cs:defRPr sz="900" b="0" kern="1200" spc="20" baseline="0"/>
+  </cs:categoryAxis>
+  <cs:chartArea mods="allowNoLineOverride">
+    <cs:lnRef idx="0"/>
+    <cs:fillRef idx="0"/>
+    <cs:effectRef idx="0"/>
+    <cs:fontRef idx="minor">
+      <a:schemeClr val="dk1"/>
+    </cs:fontRef>
+    <cs:spPr>
+      <a:solidFill>
+        <a:schemeClr val="lt1"/>
+      </a:solidFill>
+      <a:ln w="9525" cap="flat" cmpd="sng" algn="ctr">
+        <a:solidFill>
+          <a:schemeClr val="dk1">
+            <a:lumMod val="15000"/>
+            <a:lumOff val="85000"/>
+          </a:schemeClr>
+        </a:solidFill>
+        <a:round/>
+      </a:ln>
+    </cs:spPr>
+    <cs:defRPr sz="900" kern="1200"/>
+  </cs:chartArea>
+  <cs:dataLabel>
+    <cs:lnRef idx="0"/>
+    <cs:fillRef idx="0"/>
+    <cs:effectRef idx="0"/>
+    <cs:fontRef idx="minor">
+      <a:schemeClr val="dk1">
+        <a:lumMod val="65000"/>
+        <a:lumOff val="35000"/>
+      </a:schemeClr>
+    </cs:fontRef>
+    <cs:defRPr sz="900" kern="1200"/>
+  </cs:dataLabel>
+  <cs:dataLabelCallout>
+    <cs:lnRef idx="0"/>
+    <cs:fillRef idx="0"/>
+    <cs:effectRef idx="0"/>
+    <cs:fontRef idx="minor">
+      <a:schemeClr val="dk1">
+        <a:lumMod val="65000"/>
+        <a:lumOff val="35000"/>
+      </a:schemeClr>
+    </cs:fontRef>
+    <cs:spPr>
+      <a:solidFill>
+        <a:schemeClr val="lt1"/>
+      </a:solidFill>
+      <a:ln>
+        <a:solidFill>
+          <a:schemeClr val="dk1">
+            <a:lumMod val="25000"/>
+            <a:lumOff val="75000"/>
+          </a:schemeClr>
+        </a:solidFill>
+      </a:ln>
+    </cs:spPr>
+    <cs:defRPr sz="900" kern="1200"/>
+    <cs:bodyPr rot="0" spcFirstLastPara="1" vertOverflow="clip" horzOverflow="clip" vert="horz" wrap="square" lIns="36576" tIns="18288" rIns="36576" bIns="18288" anchor="ctr" anchorCtr="1">
+      <a:spAutoFit/>
+    </cs:bodyPr>
+  </cs:dataLabelCallout>
+  <cs:dataPoint>
+    <cs:lnRef idx="0">
+      <cs:styleClr val="auto"/>
+    </cs:lnRef>
+    <cs:fillRef idx="2">
+      <cs:styleClr val="auto"/>
+    </cs:fillRef>
+    <cs:effectRef idx="1"/>
+    <cs:fontRef idx="minor">
+      <a:schemeClr val="dk1"/>
+    </cs:fontRef>
+    <cs:spPr>
+      <a:ln w="9525" cap="flat" cmpd="sng" algn="ctr">
+        <a:solidFill>
+          <a:schemeClr val="phClr">
+            <a:shade val="95000"/>
+          </a:schemeClr>
+        </a:solidFill>
+        <a:round/>
+      </a:ln>
+    </cs:spPr>
+  </cs:dataPoint>
+  <cs:dataPoint3D>
+    <cs:lnRef idx="0">
+      <cs:styleClr val="auto"/>
+    </cs:lnRef>
+    <cs:fillRef idx="2">
+      <cs:styleClr val="auto"/>
+    </cs:fillRef>
+    <cs:effectRef idx="1"/>
+    <cs:fontRef idx="minor">
+      <a:schemeClr val="dk1"/>
+    </cs:fontRef>
+    <cs:spPr>
+      <a:ln w="9525" cap="flat" cmpd="sng" algn="ctr">
+        <a:solidFill>
+          <a:schemeClr val="phClr">
+            <a:shade val="95000"/>
+          </a:schemeClr>
+        </a:solidFill>
+        <a:round/>
+      </a:ln>
+    </cs:spPr>
+  </cs:dataPoint3D>
+  <cs:dataPointLine>
+    <cs:lnRef idx="0">
+      <cs:styleClr val="auto"/>
+    </cs:lnRef>
+    <cs:fillRef idx="0"/>
+    <cs:effectRef idx="0"/>
+    <cs:fontRef idx="minor">
+      <a:schemeClr val="dk1"/>
+    </cs:fontRef>
+    <cs:spPr>
+      <a:ln w="22225" cap="rnd" cmpd="sng" algn="ctr">
+        <a:solidFill>
+          <a:schemeClr val="phClr"/>
+        </a:solidFill>
+        <a:round/>
+      </a:ln>
+    </cs:spPr>
+  </cs:dataPointLine>
+  <cs:dataPointMarker>
+    <cs:lnRef idx="0">
+      <cs:styleClr val="auto"/>
+    </cs:lnRef>
+    <cs:fillRef idx="0">
+      <cs:styleClr val="auto"/>
+    </cs:fillRef>
+    <cs:effectRef idx="0"/>
+    <cs:fontRef idx="minor">
+      <a:schemeClr val="dk1"/>
+    </cs:fontRef>
+    <cs:spPr>
+      <a:solidFill>
+        <a:schemeClr val="phClr"/>
+      </a:solidFill>
+      <a:ln w="9525" cap="flat" cmpd="sng" algn="ctr">
+        <a:solidFill>
+          <a:schemeClr val="phClr"/>
+        </a:solidFill>
+        <a:round/>
+      </a:ln>
+    </cs:spPr>
+  </cs:dataPointMarker>
+  <cs:dataPointMarkerLayout symbol="circle" size="4"/>
+  <cs:dataPointWireframe>
+    <cs:lnRef idx="0">
+      <cs:styleClr val="auto"/>
+    </cs:lnRef>
+    <cs:fillRef idx="0"/>
+    <cs:effectRef idx="0"/>
+    <cs:fontRef idx="minor">
+      <a:schemeClr val="dk1"/>
+    </cs:fontRef>
+    <cs:spPr>
+      <a:ln w="9525" cap="rnd">
+        <a:solidFill>
+          <a:schemeClr val="phClr"/>
+        </a:solidFill>
+        <a:round/>
+      </a:ln>
+    </cs:spPr>
+  </cs:dataPointWireframe>
+  <cs:dataTable>
+    <cs:lnRef idx="0"/>
+    <cs:fillRef idx="0"/>
+    <cs:effectRef idx="0"/>
+    <cs:fontRef idx="minor">
+      <a:schemeClr val="dk1">
+        <a:lumMod val="65000"/>
+        <a:lumOff val="35000"/>
+      </a:schemeClr>
+    </cs:fontRef>
+    <cs:spPr>
+      <a:ln w="9525">
+        <a:solidFill>
+          <a:schemeClr val="dk1">
+            <a:lumMod val="15000"/>
+            <a:lumOff val="85000"/>
+          </a:schemeClr>
+        </a:solidFill>
+      </a:ln>
+    </cs:spPr>
+    <cs:defRPr sz="900" kern="1200"/>
+  </cs:dataTable>
+  <cs:downBar>
+    <cs:lnRef idx="0"/>
+    <cs:fillRef idx="0"/>
+    <cs:effectRef idx="0"/>
+    <cs:fontRef idx="minor">
+      <a:schemeClr val="dk1"/>
+    </cs:fontRef>
+    <cs:spPr>
+      <a:solidFill>
+        <a:schemeClr val="dk1">
+          <a:lumMod val="75000"/>
+          <a:lumOff val="25000"/>
+        </a:schemeClr>
+      </a:solidFill>
+      <a:ln w="9525">
+        <a:solidFill>
+          <a:schemeClr val="dk1">
+            <a:lumMod val="65000"/>
+            <a:lumOff val="35000"/>
+          </a:schemeClr>
+        </a:solidFill>
+      </a:ln>
+    </cs:spPr>
+  </cs:downBar>
+  <cs:dropLine>
+    <cs:lnRef idx="0"/>
+    <cs:fillRef idx="0"/>
+    <cs:effectRef idx="0"/>
+    <cs:fontRef idx="minor">
+      <a:schemeClr val="dk1"/>
+    </cs:fontRef>
+    <cs:spPr>
+      <a:ln w="9525" cap="flat" cmpd="sng" algn="ctr">
+        <a:solidFill>
+          <a:schemeClr val="dk1">
+            <a:lumMod val="35000"/>
+            <a:lumOff val="65000"/>
+            <a:alpha val="33000"/>
+          </a:schemeClr>
+        </a:solidFill>
+        <a:round/>
+      </a:ln>
+    </cs:spPr>
+  </cs:dropLine>
+  <cs:errorBar>
+    <cs:lnRef idx="0"/>
+    <cs:fillRef idx="0"/>
+    <cs:effectRef idx="0"/>
+    <cs:fontRef idx="minor">
+      <a:schemeClr val="dk1"/>
+    </cs:fontRef>
+    <cs:spPr>
+      <a:ln w="9525">
+        <a:solidFill>
+          <a:schemeClr val="dk1">
+            <a:lumMod val="65000"/>
+            <a:lumOff val="35000"/>
+          </a:schemeClr>
+        </a:solidFill>
+      </a:ln>
+    </cs:spPr>
+  </cs:errorBar>
+  <cs:floor>
+    <cs:lnRef idx="0"/>
+    <cs:fillRef idx="0"/>
+    <cs:effectRef idx="0"/>
+    <cs:fontRef idx="minor">
+      <a:schemeClr val="dk1"/>
+    </cs:fontRef>
+  </cs:floor>
+  <cs:gridlineMajor>
+    <cs:lnRef idx="0"/>
+    <cs:fillRef idx="0"/>
+    <cs:effectRef idx="0"/>
+    <cs:fontRef idx="minor">
+      <a:schemeClr val="dk1"/>
+    </cs:fontRef>
+    <cs:spPr>
+      <a:ln>
+        <a:solidFill>
+          <a:schemeClr val="dk1">
+            <a:lumMod val="15000"/>
+            <a:lumOff val="85000"/>
+          </a:schemeClr>
+        </a:solidFill>
+      </a:ln>
+    </cs:spPr>
+  </cs:gridlineMajor>
+  <cs:gridlineMinor>
+    <cs:lnRef idx="0"/>
+    <cs:fillRef idx="0"/>
+    <cs:effectRef idx="0"/>
+    <cs:fontRef idx="minor">
+      <a:schemeClr val="dk1"/>
+    </cs:fontRef>
+    <cs:spPr>
+      <a:ln>
+        <a:solidFill>
+          <a:schemeClr val="dk1">
+            <a:lumMod val="5000"/>
+            <a:lumOff val="95000"/>
+          </a:schemeClr>
+        </a:solidFill>
+      </a:ln>
+    </cs:spPr>
+  </cs:gridlineMinor>
+  <cs:hiLoLine>
+    <cs:lnRef idx="0"/>
+    <cs:fillRef idx="0"/>
+    <cs:effectRef idx="0"/>
+    <cs:fontRef idx="minor">
+      <a:schemeClr val="dk1"/>
+    </cs:fontRef>
+    <cs:spPr>
+      <a:ln w="9525">
+        <a:solidFill>
+          <a:schemeClr val="dk1">
+            <a:lumMod val="35000"/>
+            <a:lumOff val="65000"/>
+          </a:schemeClr>
+        </a:solidFill>
+      </a:ln>
+    </cs:spPr>
+  </cs:hiLoLine>
+  <cs:leaderLine>
+    <cs:lnRef idx="0"/>
+    <cs:fillRef idx="0"/>
+    <cs:effectRef idx="0"/>
+    <cs:fontRef idx="minor">
+      <a:schemeClr val="dk1"/>
+    </cs:fontRef>
+    <cs:spPr>
+      <a:ln w="9525">
+        <a:solidFill>
+          <a:schemeClr val="dk1">
+            <a:lumMod val="35000"/>
+            <a:lumOff val="65000"/>
+          </a:schemeClr>
+        </a:solidFill>
+      </a:ln>
+    </cs:spPr>
+  </cs:leaderLine>
+  <cs:legend>
+    <cs:lnRef idx="0"/>
+    <cs:fillRef idx="0"/>
+    <cs:effectRef idx="0"/>
+    <cs:fontRef idx="minor">
+      <a:schemeClr val="dk1">
+        <a:lumMod val="65000"/>
+        <a:lumOff val="35000"/>
+      </a:schemeClr>
+    </cs:fontRef>
+    <cs:defRPr sz="900" kern="1200"/>
+  </cs:legend>
+  <cs:plotArea>
+    <cs:lnRef idx="0"/>
+    <cs:fillRef idx="0"/>
+    <cs:effectRef idx="0"/>
+    <cs:fontRef idx="minor">
+      <a:schemeClr val="dk1"/>
+    </cs:fontRef>
+    <cs:spPr>
+      <a:gradFill>
+        <a:gsLst>
+          <a:gs pos="100000">
+            <a:schemeClr val="lt1">
+              <a:lumMod val="95000"/>
+            </a:schemeClr>
+          </a:gs>
+          <a:gs pos="0">
+            <a:schemeClr val="lt1"/>
+          </a:gs>
+        </a:gsLst>
+        <a:lin ang="5400000" scaled="0"/>
+      </a:gradFill>
+    </cs:spPr>
+  </cs:plotArea>
+  <cs:plotArea3D>
+    <cs:lnRef idx="0"/>
+    <cs:fillRef idx="0"/>
+    <cs:effectRef idx="0"/>
+    <cs:fontRef idx="minor">
+      <a:schemeClr val="dk1"/>
+    </cs:fontRef>
+  </cs:plotArea3D>
+  <cs:seriesAxis>
+    <cs:lnRef idx="0"/>
+    <cs:fillRef idx="0"/>
+    <cs:effectRef idx="0"/>
+    <cs:fontRef idx="minor">
+      <a:schemeClr val="dk1">
+        <a:lumMod val="65000"/>
+        <a:lumOff val="35000"/>
+      </a:schemeClr>
+    </cs:fontRef>
+    <cs:spPr>
+      <a:ln w="9525" cap="flat" cmpd="sng" algn="ctr">
+        <a:solidFill>
+          <a:schemeClr val="dk1">
+            <a:lumMod val="15000"/>
+            <a:lumOff val="85000"/>
+          </a:schemeClr>
+        </a:solidFill>
+        <a:round/>
+      </a:ln>
+    </cs:spPr>
+    <cs:defRPr sz="900" kern="1200"/>
+  </cs:seriesAxis>
+  <cs:seriesLine>
+    <cs:lnRef idx="0"/>
+    <cs:fillRef idx="0"/>
+    <cs:effectRef idx="0"/>
+    <cs:fontRef idx="minor">
+      <a:schemeClr val="dk1"/>
+    </cs:fontRef>
+    <cs:spPr>
+      <a:ln w="9525">
+        <a:solidFill>
+          <a:schemeClr val="dk1">
+            <a:lumMod val="35000"/>
+            <a:lumOff val="65000"/>
+          </a:schemeClr>
+        </a:solidFill>
+        <a:prstDash val="dash"/>
+      </a:ln>
+    </cs:spPr>
+  </cs:seriesLine>
+  <cs:title>
+    <cs:lnRef idx="0"/>
+    <cs:fillRef idx="0"/>
+    <cs:effectRef idx="0"/>
+    <cs:fontRef idx="minor">
+      <a:schemeClr val="dk1">
+        <a:lumMod val="50000"/>
+        <a:lumOff val="50000"/>
+      </a:schemeClr>
+    </cs:fontRef>
+    <cs:defRPr sz="1400" kern="1200" cap="none" spc="20" baseline="0"/>
+  </cs:title>
+  <cs:trendline>
+    <cs:lnRef idx="0">
+      <cs:styleClr val="auto"/>
+    </cs:lnRef>
+    <cs:fillRef idx="0"/>
+    <cs:effectRef idx="0"/>
+    <cs:fontRef idx="minor">
+      <a:schemeClr val="dk1"/>
+    </cs:fontRef>
+    <cs:spPr>
+      <a:ln w="9525" cap="rnd">
+        <a:solidFill>
+          <a:schemeClr val="phClr"/>
+        </a:solidFill>
+      </a:ln>
+    </cs:spPr>
+  </cs:trendline>
+  <cs:trendlineLabel>
+    <cs:lnRef idx="0"/>
+    <cs:fillRef idx="0"/>
+    <cs:effectRef idx="0"/>
+    <cs:fontRef idx="minor">
+      <a:schemeClr val="dk1">
+        <a:lumMod val="65000"/>
+        <a:lumOff val="35000"/>
+      </a:schemeClr>
+    </cs:fontRef>
+    <cs:defRPr sz="900" kern="1200"/>
+  </cs:trendlineLabel>
+  <cs:upBar>
+    <cs:lnRef idx="0"/>
+    <cs:fillRef idx="0"/>
+    <cs:effectRef idx="0"/>
+    <cs:fontRef idx="minor">
+      <a:schemeClr val="dk1"/>
+    </cs:fontRef>
+    <cs:spPr>
+      <a:solidFill>
+        <a:schemeClr val="lt1"/>
+      </a:solidFill>
+      <a:ln w="9525">
+        <a:solidFill>
+          <a:schemeClr val="dk1">
+            <a:lumMod val="65000"/>
+            <a:lumOff val="35000"/>
+          </a:schemeClr>
+        </a:solidFill>
+      </a:ln>
+    </cs:spPr>
+  </cs:upBar>
+  <cs:valueAxis>
+    <cs:lnRef idx="0"/>
+    <cs:fillRef idx="0"/>
+    <cs:effectRef idx="0"/>
+    <cs:fontRef idx="minor">
+      <a:schemeClr val="dk1">
+        <a:lumMod val="65000"/>
+        <a:lumOff val="35000"/>
+      </a:schemeClr>
+    </cs:fontRef>
+    <cs:defRPr sz="900" kern="1200" spc="20" baseline="0"/>
+  </cs:valueAxis>
+  <cs:wall>
+    <cs:lnRef idx="0"/>
+    <cs:fillRef idx="0"/>
+    <cs:effectRef idx="0"/>
+    <cs:fontRef idx="minor">
+      <a:schemeClr val="dk1"/>
+    </cs:fontRef>
+  </cs:wall>
+</cs:chartStyle>
+</file>
+
+<file path=ppt/charts/style2.xml><?xml version="1.0" encoding="utf-8"?>
+<cs:chartStyle xmlns:cs="http://schemas.microsoft.com/office/drawing/2012/chartStyle" xmlns:a="http://schemas.openxmlformats.org/drawingml/2006/main" id="227">
+  <cs:axisTitle>
+    <cs:lnRef idx="0"/>
+    <cs:fillRef idx="0"/>
+    <cs:effectRef idx="0"/>
+    <cs:fontRef idx="minor">
+      <a:schemeClr val="tx1">
+        <a:lumMod val="65000"/>
+        <a:lumOff val="35000"/>
+      </a:schemeClr>
+    </cs:fontRef>
+    <cs:defRPr sz="1330" kern="1200"/>
+  </cs:axisTitle>
+  <cs:categoryAxis>
+    <cs:lnRef idx="0"/>
+    <cs:fillRef idx="0"/>
+    <cs:effectRef idx="0"/>
+    <cs:fontRef idx="minor">
+      <a:schemeClr val="tx1">
+        <a:lumMod val="65000"/>
+        <a:lumOff val="35000"/>
+      </a:schemeClr>
+    </cs:fontRef>
+    <cs:spPr>
+      <a:ln w="9525" cap="flat" cmpd="sng" algn="ctr">
+        <a:solidFill>
+          <a:schemeClr val="tx1">
+            <a:lumMod val="15000"/>
+            <a:lumOff val="85000"/>
+          </a:schemeClr>
+        </a:solidFill>
+        <a:round/>
+      </a:ln>
+    </cs:spPr>
+    <cs:defRPr sz="1197" kern="1200"/>
+  </cs:categoryAxis>
+  <cs:chartArea mods="allowNoFillOverride allowNoLineOverride">
+    <cs:lnRef idx="0"/>
+    <cs:fillRef idx="0"/>
+    <cs:effectRef idx="0"/>
+    <cs:fontRef idx="minor">
+      <a:schemeClr val="tx1"/>
+    </cs:fontRef>
+    <cs:spPr>
+      <a:solidFill>
+        <a:schemeClr val="bg1"/>
+      </a:solidFill>
+      <a:ln w="9525" cap="flat" cmpd="sng" algn="ctr">
+        <a:solidFill>
+          <a:schemeClr val="tx1">
+            <a:lumMod val="15000"/>
+            <a:lumOff val="85000"/>
+          </a:schemeClr>
+        </a:solidFill>
+        <a:round/>
+      </a:ln>
+    </cs:spPr>
+    <cs:defRPr sz="1330" kern="1200"/>
+  </cs:chartArea>
+  <cs:dataLabel>
+    <cs:lnRef idx="0"/>
+    <cs:fillRef idx="0"/>
+    <cs:effectRef idx="0"/>
+    <cs:fontRef idx="minor">
+      <a:schemeClr val="tx1">
+        <a:lumMod val="75000"/>
+        <a:lumOff val="25000"/>
+      </a:schemeClr>
+    </cs:fontRef>
+    <cs:defRPr sz="1197" kern="1200"/>
+  </cs:dataLabel>
+  <cs:dataLabelCallout>
+    <cs:lnRef idx="0"/>
+    <cs:fillRef idx="0"/>
+    <cs:effectRef idx="0"/>
+    <cs:fontRef idx="minor">
+      <a:schemeClr val="dk1">
+        <a:lumMod val="65000"/>
+        <a:lumOff val="35000"/>
+      </a:schemeClr>
+    </cs:fontRef>
+    <cs:spPr>
+      <a:solidFill>
+        <a:schemeClr val="lt1"/>
+      </a:solidFill>
+      <a:ln>
+        <a:solidFill>
+          <a:schemeClr val="dk1">
+            <a:lumMod val="25000"/>
+            <a:lumOff val="75000"/>
+          </a:schemeClr>
+        </a:solidFill>
+      </a:ln>
+    </cs:spPr>
+    <cs:defRPr sz="1197" kern="1200"/>
+    <cs:bodyPr rot="0" spcFirstLastPara="1" vertOverflow="clip" horzOverflow="clip" vert="horz" wrap="square" lIns="36576" tIns="18288" rIns="36576" bIns="18288" anchor="ctr" anchorCtr="1">
+      <a:spAutoFit/>
+    </cs:bodyPr>
+  </cs:dataLabelCallout>
+  <cs:dataPoint>
+    <cs:lnRef idx="0"/>
+    <cs:fillRef idx="1">
+      <cs:styleClr val="auto"/>
+    </cs:fillRef>
+    <cs:effectRef idx="0"/>
+    <cs:fontRef idx="minor">
+      <a:schemeClr val="tx1"/>
+    </cs:fontRef>
+    <cs:spPr>
+      <a:solidFill>
+        <a:schemeClr val="phClr"/>
+      </a:solidFill>
+    </cs:spPr>
+  </cs:dataPoint>
+  <cs:dataPoint3D>
+    <cs:lnRef idx="0"/>
+    <cs:fillRef idx="1">
+      <cs:styleClr val="auto"/>
+    </cs:fillRef>
+    <cs:effectRef idx="0"/>
+    <cs:fontRef idx="minor">
+      <a:schemeClr val="tx1"/>
+    </cs:fontRef>
+    <cs:spPr>
+      <a:solidFill>
+        <a:schemeClr val="phClr"/>
+      </a:solidFill>
+    </cs:spPr>
+  </cs:dataPoint3D>
+  <cs:dataPointLine>
+    <cs:lnRef idx="0">
+      <cs:styleClr val="auto"/>
+    </cs:lnRef>
+    <cs:fillRef idx="1"/>
+    <cs:effectRef idx="0"/>
+    <cs:fontRef idx="minor">
+      <a:schemeClr val="tx1"/>
+    </cs:fontRef>
+    <cs:spPr>
+      <a:ln w="28575" cap="rnd">
+        <a:solidFill>
+          <a:schemeClr val="phClr"/>
+        </a:solidFill>
+        <a:round/>
+      </a:ln>
+    </cs:spPr>
+  </cs:dataPointLine>
+  <cs:dataPointMarker>
+    <cs:lnRef idx="0">
+      <cs:styleClr val="auto"/>
+    </cs:lnRef>
+    <cs:fillRef idx="1">
+      <cs:styleClr val="auto"/>
+    </cs:fillRef>
+    <cs:effectRef idx="0"/>
+    <cs:fontRef idx="minor">
+      <a:schemeClr val="tx1"/>
+    </cs:fontRef>
+    <cs:spPr>
+      <a:solidFill>
+        <a:schemeClr val="phClr"/>
+      </a:solidFill>
+      <a:ln w="9525">
+        <a:solidFill>
+          <a:schemeClr val="phClr"/>
+        </a:solidFill>
+      </a:ln>
+    </cs:spPr>
+  </cs:dataPointMarker>
+  <cs:dataPointMarkerLayout symbol="circle" size="5"/>
+  <cs:dataPointWireframe>
+    <cs:lnRef idx="0">
+      <cs:styleClr val="auto"/>
+    </cs:lnRef>
+    <cs:fillRef idx="1"/>
+    <cs:effectRef idx="0"/>
+    <cs:fontRef idx="minor">
+      <a:schemeClr val="tx1"/>
+    </cs:fontRef>
+    <cs:spPr>
+      <a:ln w="9525" cap="rnd">
+        <a:solidFill>
+          <a:schemeClr val="phClr"/>
+        </a:solidFill>
+        <a:round/>
+      </a:ln>
+    </cs:spPr>
+  </cs:dataPointWireframe>
+  <cs:dataTable>
+    <cs:lnRef idx="0"/>
+    <cs:fillRef idx="0"/>
+    <cs:effectRef idx="0"/>
+    <cs:fontRef idx="minor">
+      <a:schemeClr val="tx1">
+        <a:lumMod val="65000"/>
+        <a:lumOff val="35000"/>
+      </a:schemeClr>
+    </cs:fontRef>
+    <cs:spPr>
+      <a:noFill/>
+      <a:ln w="9525" cap="flat" cmpd="sng" algn="ctr">
+        <a:solidFill>
+          <a:schemeClr val="tx1">
+            <a:lumMod val="15000"/>
+            <a:lumOff val="85000"/>
+          </a:schemeClr>
+        </a:solidFill>
+        <a:round/>
+      </a:ln>
+    </cs:spPr>
+    <cs:defRPr sz="1197" kern="1200"/>
+  </cs:dataTable>
+  <cs:downBar>
+    <cs:lnRef idx="0"/>
+    <cs:fillRef idx="0"/>
+    <cs:effectRef idx="0"/>
+    <cs:fontRef idx="minor">
+      <a:schemeClr val="dk1"/>
+    </cs:fontRef>
+    <cs:spPr>
+      <a:solidFill>
+        <a:schemeClr val="dk1">
+          <a:lumMod val="65000"/>
+          <a:lumOff val="35000"/>
+        </a:schemeClr>
+      </a:solidFill>
+      <a:ln w="9525">
+        <a:solidFill>
+          <a:schemeClr val="tx1">
+            <a:lumMod val="65000"/>
+            <a:lumOff val="35000"/>
+          </a:schemeClr>
+        </a:solidFill>
+      </a:ln>
+    </cs:spPr>
+  </cs:downBar>
+  <cs:dropLine>
+    <cs:lnRef idx="0"/>
+    <cs:fillRef idx="0"/>
+    <cs:effectRef idx="0"/>
+    <cs:fontRef idx="minor">
+      <a:schemeClr val="tx1"/>
+    </cs:fontRef>
+    <cs:spPr>
+      <a:ln w="9525" cap="flat" cmpd="sng" algn="ctr">
+        <a:solidFill>
+          <a:schemeClr val="tx1">
+            <a:lumMod val="35000"/>
+            <a:lumOff val="65000"/>
+          </a:schemeClr>
+        </a:solidFill>
+        <a:round/>
+      </a:ln>
+    </cs:spPr>
+  </cs:dropLine>
+  <cs:errorBar>
+    <cs:lnRef idx="0"/>
+    <cs:fillRef idx="0"/>
+    <cs:effectRef idx="0"/>
+    <cs:fontRef idx="minor">
+      <a:schemeClr val="tx1"/>
+    </cs:fontRef>
+    <cs:spPr>
+      <a:ln w="9525" cap="flat" cmpd="sng" algn="ctr">
+        <a:solidFill>
+          <a:schemeClr val="tx1">
+            <a:lumMod val="65000"/>
+            <a:lumOff val="35000"/>
+          </a:schemeClr>
+        </a:solidFill>
+        <a:round/>
+      </a:ln>
+    </cs:spPr>
+  </cs:errorBar>
+  <cs:floor>
+    <cs:lnRef idx="0"/>
+    <cs:fillRef idx="0"/>
+    <cs:effectRef idx="0"/>
+    <cs:fontRef idx="minor">
+      <a:schemeClr val="tx1"/>
+    </cs:fontRef>
+    <cs:spPr>
+      <a:noFill/>
+      <a:ln>
+        <a:noFill/>
+      </a:ln>
+    </cs:spPr>
+  </cs:floor>
+  <cs:gridlineMajor>
+    <cs:lnRef idx="0"/>
+    <cs:fillRef idx="0"/>
+    <cs:effectRef idx="0"/>
+    <cs:fontRef idx="minor">
+      <a:schemeClr val="tx1"/>
+    </cs:fontRef>
+    <cs:spPr>
+      <a:ln w="9525" cap="flat" cmpd="sng" algn="ctr">
+        <a:solidFill>
+          <a:schemeClr val="tx1">
+            <a:lumMod val="15000"/>
+            <a:lumOff val="85000"/>
+          </a:schemeClr>
+        </a:solidFill>
+        <a:round/>
+      </a:ln>
+    </cs:spPr>
+  </cs:gridlineMajor>
+  <cs:gridlineMinor>
+    <cs:lnRef idx="0"/>
+    <cs:fillRef idx="0"/>
+    <cs:effectRef idx="0"/>
+    <cs:fontRef idx="minor">
+      <a:schemeClr val="tx1"/>
+    </cs:fontRef>
+    <cs:spPr>
+      <a:ln w="9525" cap="flat" cmpd="sng" algn="ctr">
+        <a:solidFill>
+          <a:schemeClr val="tx1">
+            <a:lumMod val="5000"/>
+            <a:lumOff val="95000"/>
+          </a:schemeClr>
+        </a:solidFill>
+        <a:round/>
+      </a:ln>
+    </cs:spPr>
+  </cs:gridlineMinor>
+  <cs:hiLoLine>
+    <cs:lnRef idx="0"/>
+    <cs:fillRef idx="0"/>
+    <cs:effectRef idx="0"/>
+    <cs:fontRef idx="minor">
+      <a:schemeClr val="tx1"/>
+    </cs:fontRef>
+    <cs:spPr>
+      <a:ln w="9525" cap="flat" cmpd="sng" algn="ctr">
+        <a:solidFill>
+          <a:schemeClr val="tx1">
+            <a:lumMod val="75000"/>
+            <a:lumOff val="25000"/>
+          </a:schemeClr>
+        </a:solidFill>
+        <a:round/>
+      </a:ln>
+    </cs:spPr>
+  </cs:hiLoLine>
+  <cs:leaderLine>
+    <cs:lnRef idx="0"/>
+    <cs:fillRef idx="0"/>
+    <cs:effectRef idx="0"/>
+    <cs:fontRef idx="minor">
+      <a:schemeClr val="tx1"/>
+    </cs:fontRef>
+    <cs:spPr>
+      <a:ln w="9525" cap="flat" cmpd="sng" algn="ctr">
+        <a:solidFill>
+          <a:schemeClr val="tx1">
+            <a:lumMod val="35000"/>
+            <a:lumOff val="65000"/>
+          </a:schemeClr>
+        </a:solidFill>
+        <a:round/>
+      </a:ln>
+    </cs:spPr>
+  </cs:leaderLine>
+  <cs:legend>
+    <cs:lnRef idx="0"/>
+    <cs:fillRef idx="0"/>
+    <cs:effectRef idx="0"/>
+    <cs:fontRef idx="minor">
+      <a:schemeClr val="tx1">
+        <a:lumMod val="65000"/>
+        <a:lumOff val="35000"/>
+      </a:schemeClr>
+    </cs:fontRef>
+    <cs:defRPr sz="1197" kern="1200"/>
+  </cs:legend>
+  <cs:plotArea mods="allowNoFillOverride allowNoLineOverride">
+    <cs:lnRef idx="0"/>
+    <cs:fillRef idx="0"/>
+    <cs:effectRef idx="0"/>
+    <cs:fontRef idx="minor">
+      <a:schemeClr val="tx1"/>
+    </cs:fontRef>
+  </cs:plotArea>
+  <cs:plotArea3D mods="allowNoFillOverride allowNoLineOverride">
+    <cs:lnRef idx="0"/>
+    <cs:fillRef idx="0"/>
+    <cs:effectRef idx="0"/>
+    <cs:fontRef idx="minor">
+      <a:schemeClr val="tx1"/>
+    </cs:fontRef>
+  </cs:plotArea3D>
+  <cs:seriesAxis>
+    <cs:lnRef idx="0"/>
+    <cs:fillRef idx="0"/>
+    <cs:effectRef idx="0"/>
+    <cs:fontRef idx="minor">
+      <a:schemeClr val="tx1">
+        <a:lumMod val="65000"/>
+        <a:lumOff val="35000"/>
+      </a:schemeClr>
+    </cs:fontRef>
+    <cs:defRPr sz="1197" kern="1200"/>
+  </cs:seriesAxis>
+  <cs:seriesLine>
+    <cs:lnRef idx="0"/>
+    <cs:fillRef idx="0"/>
+    <cs:effectRef idx="0"/>
+    <cs:fontRef idx="minor">
+      <a:schemeClr val="tx1"/>
+    </cs:fontRef>
+    <cs:spPr>
+      <a:ln w="9525" cap="flat" cmpd="sng" algn="ctr">
+        <a:solidFill>
+          <a:schemeClr val="tx1">
+            <a:lumMod val="35000"/>
+            <a:lumOff val="65000"/>
+          </a:schemeClr>
+        </a:solidFill>
+        <a:round/>
+      </a:ln>
+    </cs:spPr>
+  </cs:seriesLine>
+  <cs:title>
+    <cs:lnRef idx="0"/>
+    <cs:fillRef idx="0"/>
+    <cs:effectRef idx="0"/>
+    <cs:fontRef idx="minor">
+      <a:schemeClr val="tx1">
+        <a:lumMod val="65000"/>
+        <a:lumOff val="35000"/>
+      </a:schemeClr>
+    </cs:fontRef>
+    <cs:defRPr sz="1862" b="0" kern="1200" spc="0" baseline="0"/>
+  </cs:title>
+  <cs:trendline>
+    <cs:lnRef idx="0">
+      <cs:styleClr val="auto"/>
+    </cs:lnRef>
+    <cs:fillRef idx="0"/>
+    <cs:effectRef idx="0"/>
+    <cs:fontRef idx="minor">
+      <a:schemeClr val="tx1"/>
+    </cs:fontRef>
+    <cs:spPr>
+      <a:ln w="19050" cap="rnd">
+        <a:solidFill>
+          <a:schemeClr val="phClr"/>
+        </a:solidFill>
+        <a:prstDash val="sysDot"/>
+      </a:ln>
+    </cs:spPr>
+  </cs:trendline>
+  <cs:trendlineLabel>
+    <cs:lnRef idx="0"/>
+    <cs:fillRef idx="0"/>
+    <cs:effectRef idx="0"/>
+    <cs:fontRef idx="minor">
+      <a:schemeClr val="tx1">
+        <a:lumMod val="65000"/>
+        <a:lumOff val="35000"/>
+      </a:schemeClr>
+    </cs:fontRef>
+    <cs:defRPr sz="1197" kern="1200"/>
+  </cs:trendlineLabel>
+  <cs:upBar>
+    <cs:lnRef idx="0"/>
+    <cs:fillRef idx="0"/>
+    <cs:effectRef idx="0"/>
+    <cs:fontRef idx="minor">
+      <a:schemeClr val="dk1"/>
+    </cs:fontRef>
+    <cs:spPr>
+      <a:solidFill>
+        <a:schemeClr val="lt1"/>
+      </a:solidFill>
+      <a:ln w="9525">
+        <a:solidFill>
+          <a:schemeClr val="tx1">
+            <a:lumMod val="15000"/>
+            <a:lumOff val="85000"/>
+          </a:schemeClr>
+        </a:solidFill>
+      </a:ln>
+    </cs:spPr>
+  </cs:upBar>
+  <cs:valueAxis>
+    <cs:lnRef idx="0"/>
+    <cs:fillRef idx="0"/>
+    <cs:effectRef idx="0"/>
+    <cs:fontRef idx="minor">
+      <a:schemeClr val="tx1">
+        <a:lumMod val="65000"/>
+        <a:lumOff val="35000"/>
+      </a:schemeClr>
+    </cs:fontRef>
+    <cs:defRPr sz="1197" kern="1200"/>
+  </cs:valueAxis>
+  <cs:wall>
+    <cs:lnRef idx="0"/>
+    <cs:fillRef idx="0"/>
+    <cs:effectRef idx="0"/>
+    <cs:fontRef idx="minor">
+      <a:schemeClr val="tx1"/>
+    </cs:fontRef>
+    <cs:spPr>
+      <a:noFill/>
+      <a:ln>
+        <a:noFill/>
+      </a:ln>
+    </cs:spPr>
+  </cs:wall>
+</cs:chartStyle>
+</file>
+
+<file path=ppt/charts/style3.xml><?xml version="1.0" encoding="utf-8"?>
+<cs:chartStyle xmlns:cs="http://schemas.microsoft.com/office/drawing/2012/chartStyle" xmlns:a="http://schemas.openxmlformats.org/drawingml/2006/main" id="240">
+  <cs:axisTitle>
+    <cs:lnRef idx="0"/>
+    <cs:fillRef idx="0"/>
+    <cs:effectRef idx="0"/>
+    <cs:fontRef idx="minor">
+      <a:schemeClr val="tx1">
+        <a:lumMod val="65000"/>
+        <a:lumOff val="35000"/>
+      </a:schemeClr>
+    </cs:fontRef>
+    <cs:defRPr sz="1330" kern="1200"/>
+  </cs:axisTitle>
+  <cs:categoryAxis>
+    <cs:lnRef idx="0"/>
+    <cs:fillRef idx="0"/>
+    <cs:effectRef idx="0"/>
+    <cs:fontRef idx="minor">
+      <a:schemeClr val="tx1">
+        <a:lumMod val="65000"/>
+        <a:lumOff val="35000"/>
+      </a:schemeClr>
+    </cs:fontRef>
+    <cs:spPr>
+      <a:ln w="9525" cap="flat" cmpd="sng" algn="ctr">
+        <a:solidFill>
+          <a:schemeClr val="tx1">
+            <a:lumMod val="25000"/>
+            <a:lumOff val="75000"/>
+          </a:schemeClr>
+        </a:solidFill>
+        <a:round/>
+      </a:ln>
+    </cs:spPr>
+    <cs:defRPr sz="1197" kern="1200"/>
+  </cs:categoryAxis>
+  <cs:chartArea mods="allowNoFillOverride allowNoLineOverride">
+    <cs:lnRef idx="0"/>
+    <cs:fillRef idx="0"/>
+    <cs:effectRef idx="0"/>
+    <cs:fontRef idx="minor">
+      <a:schemeClr val="tx1"/>
+    </cs:fontRef>
+    <cs:spPr>
+      <a:solidFill>
+        <a:schemeClr val="bg1"/>
+      </a:solidFill>
+      <a:ln w="9525" cap="flat" cmpd="sng" algn="ctr">
+        <a:solidFill>
+          <a:schemeClr val="tx1">
+            <a:lumMod val="15000"/>
+            <a:lumOff val="85000"/>
+          </a:schemeClr>
+        </a:solidFill>
+        <a:round/>
+      </a:ln>
+    </cs:spPr>
+    <cs:defRPr sz="1330" kern="1200"/>
+  </cs:chartArea>
+  <cs:dataLabel>
+    <cs:lnRef idx="0"/>
+    <cs:fillRef idx="0"/>
+    <cs:effectRef idx="0"/>
+    <cs:fontRef idx="minor">
+      <a:schemeClr val="tx1">
+        <a:lumMod val="75000"/>
+        <a:lumOff val="25000"/>
+      </a:schemeClr>
+    </cs:fontRef>
+    <cs:defRPr sz="1197" kern="1200"/>
+  </cs:dataLabel>
+  <cs:dataLabelCallout>
+    <cs:lnRef idx="0"/>
+    <cs:fillRef idx="0"/>
+    <cs:effectRef idx="0"/>
+    <cs:fontRef idx="minor">
+      <a:schemeClr val="dk1">
+        <a:lumMod val="65000"/>
+        <a:lumOff val="35000"/>
+      </a:schemeClr>
+    </cs:fontRef>
+    <cs:spPr>
+      <a:solidFill>
+        <a:schemeClr val="lt1"/>
+      </a:solidFill>
+      <a:ln>
+        <a:solidFill>
+          <a:schemeClr val="dk1">
+            <a:lumMod val="25000"/>
+            <a:lumOff val="75000"/>
+          </a:schemeClr>
+        </a:solidFill>
+      </a:ln>
+    </cs:spPr>
+    <cs:defRPr sz="1197" kern="1200"/>
+    <cs:bodyPr rot="0" spcFirstLastPara="1" vertOverflow="clip" horzOverflow="clip" vert="horz" wrap="square" lIns="36576" tIns="18288" rIns="36576" bIns="18288" anchor="ctr" anchorCtr="1">
+      <a:spAutoFit/>
+    </cs:bodyPr>
+  </cs:dataLabelCallout>
+  <cs:dataPoint>
+    <cs:lnRef idx="0"/>
+    <cs:fillRef idx="1">
+      <cs:styleClr val="auto"/>
+    </cs:fillRef>
+    <cs:effectRef idx="0"/>
+    <cs:fontRef idx="minor">
+      <a:schemeClr val="tx1"/>
+    </cs:fontRef>
+  </cs:dataPoint>
+  <cs:dataPoint3D>
+    <cs:lnRef idx="0"/>
+    <cs:fillRef idx="1">
+      <cs:styleClr val="auto"/>
+    </cs:fillRef>
+    <cs:effectRef idx="0"/>
+    <cs:fontRef idx="minor">
+      <a:schemeClr val="tx1"/>
+    </cs:fontRef>
+  </cs:dataPoint3D>
+  <cs:dataPointLine>
+    <cs:lnRef idx="0">
+      <cs:styleClr val="auto"/>
+    </cs:lnRef>
+    <cs:fillRef idx="1"/>
+    <cs:effectRef idx="0"/>
+    <cs:fontRef idx="minor">
+      <a:schemeClr val="tx1"/>
+    </cs:fontRef>
+    <cs:spPr>
+      <a:ln w="19050" cap="rnd">
+        <a:solidFill>
+          <a:schemeClr val="phClr"/>
+        </a:solidFill>
+        <a:round/>
+      </a:ln>
+    </cs:spPr>
+  </cs:dataPointLine>
+  <cs:dataPointMarker>
+    <cs:lnRef idx="0">
+      <cs:styleClr val="auto"/>
+    </cs:lnRef>
+    <cs:fillRef idx="1">
+      <cs:styleClr val="auto"/>
+    </cs:fillRef>
+    <cs:effectRef idx="0"/>
+    <cs:fontRef idx="minor">
+      <a:schemeClr val="tx1"/>
+    </cs:fontRef>
+    <cs:spPr>
+      <a:ln w="9525">
+        <a:solidFill>
+          <a:schemeClr val="phClr"/>
+        </a:solidFill>
+      </a:ln>
+    </cs:spPr>
+  </cs:dataPointMarker>
+  <cs:dataPointMarkerLayout symbol="circle" size="5"/>
+  <cs:dataPointWireframe>
+    <cs:lnRef idx="0">
+      <cs:styleClr val="auto"/>
+    </cs:lnRef>
+    <cs:fillRef idx="0"/>
+    <cs:effectRef idx="0"/>
+    <cs:fontRef idx="minor">
+      <a:schemeClr val="dk1"/>
+    </cs:fontRef>
+    <cs:spPr>
+      <a:ln w="9525" cap="rnd">
+        <a:solidFill>
+          <a:schemeClr val="phClr"/>
+        </a:solidFill>
+        <a:round/>
+      </a:ln>
+    </cs:spPr>
+  </cs:dataPointWireframe>
+  <cs:dataTable>
+    <cs:lnRef idx="0"/>
+    <cs:fillRef idx="0"/>
+    <cs:effectRef idx="0"/>
+    <cs:fontRef idx="minor">
+      <a:schemeClr val="tx1">
+        <a:lumMod val="65000"/>
+        <a:lumOff val="35000"/>
+      </a:schemeClr>
+    </cs:fontRef>
+    <cs:spPr>
+      <a:noFill/>
+      <a:ln w="9525" cap="flat" cmpd="sng" algn="ctr">
+        <a:solidFill>
+          <a:schemeClr val="tx1">
+            <a:lumMod val="15000"/>
+            <a:lumOff val="85000"/>
+          </a:schemeClr>
+        </a:solidFill>
+        <a:round/>
+      </a:ln>
+    </cs:spPr>
+    <cs:defRPr sz="1197" kern="1200"/>
+  </cs:dataTable>
+  <cs:downBar>
+    <cs:lnRef idx="0"/>
+    <cs:fillRef idx="0"/>
+    <cs:effectRef idx="0"/>
+    <cs:fontRef idx="minor">
+      <a:schemeClr val="tx1"/>
+    </cs:fontRef>
+    <cs:spPr>
+      <a:solidFill>
+        <a:schemeClr val="dk1">
+          <a:lumMod val="75000"/>
+          <a:lumOff val="25000"/>
+        </a:schemeClr>
+      </a:solidFill>
+      <a:ln w="9525" cap="flat" cmpd="sng" algn="ctr">
+        <a:solidFill>
+          <a:schemeClr val="tx1">
+            <a:lumMod val="65000"/>
+            <a:lumOff val="35000"/>
+          </a:schemeClr>
+        </a:solidFill>
+        <a:round/>
+      </a:ln>
+    </cs:spPr>
+  </cs:downBar>
+  <cs:dropLine>
+    <cs:lnRef idx="0"/>
+    <cs:fillRef idx="0"/>
+    <cs:effectRef idx="0"/>
+    <cs:fontRef idx="minor">
+      <a:schemeClr val="tx1"/>
+    </cs:fontRef>
+    <cs:spPr>
+      <a:ln w="9525" cap="flat" cmpd="sng" algn="ctr">
+        <a:solidFill>
+          <a:schemeClr val="tx1">
+            <a:lumMod val="35000"/>
+            <a:lumOff val="65000"/>
+          </a:schemeClr>
+        </a:solidFill>
+        <a:round/>
+      </a:ln>
+    </cs:spPr>
+  </cs:dropLine>
+  <cs:errorBar>
+    <cs:lnRef idx="0"/>
+    <cs:fillRef idx="0"/>
+    <cs:effectRef idx="0"/>
+    <cs:fontRef idx="minor">
+      <a:schemeClr val="tx1"/>
+    </cs:fontRef>
+    <cs:spPr>
+      <a:ln w="9525" cap="flat" cmpd="sng" algn="ctr">
+        <a:solidFill>
+          <a:schemeClr val="tx1">
+            <a:lumMod val="65000"/>
+            <a:lumOff val="35000"/>
+          </a:schemeClr>
+        </a:solidFill>
+        <a:round/>
+      </a:ln>
+    </cs:spPr>
+  </cs:errorBar>
+  <cs:floor>
+    <cs:lnRef idx="0"/>
+    <cs:fillRef idx="0"/>
+    <cs:effectRef idx="0"/>
+    <cs:fontRef idx="minor">
+      <a:schemeClr val="tx1"/>
+    </cs:fontRef>
+    <cs:spPr>
+      <a:noFill/>
+      <a:ln>
+        <a:noFill/>
+      </a:ln>
+    </cs:spPr>
+  </cs:floor>
+  <cs:gridlineMajor>
+    <cs:lnRef idx="0"/>
+    <cs:fillRef idx="0"/>
+    <cs:effectRef idx="0"/>
+    <cs:fontRef idx="minor">
+      <a:schemeClr val="tx1"/>
+    </cs:fontRef>
+    <cs:spPr>
+      <a:ln w="9525" cap="flat" cmpd="sng" algn="ctr">
+        <a:solidFill>
+          <a:schemeClr val="tx1">
+            <a:lumMod val="15000"/>
+            <a:lumOff val="85000"/>
+          </a:schemeClr>
+        </a:solidFill>
+        <a:round/>
+      </a:ln>
+    </cs:spPr>
+  </cs:gridlineMajor>
+  <cs:gridlineMinor>
+    <cs:lnRef idx="0"/>
+    <cs:fillRef idx="0"/>
+    <cs:effectRef idx="0"/>
+    <cs:fontRef idx="minor">
+      <a:schemeClr val="tx1"/>
+    </cs:fontRef>
+    <cs:spPr>
+      <a:ln w="9525" cap="flat" cmpd="sng" algn="ctr">
+        <a:solidFill>
+          <a:schemeClr val="tx1">
+            <a:lumMod val="5000"/>
+            <a:lumOff val="95000"/>
+          </a:schemeClr>
+        </a:solidFill>
+        <a:round/>
+      </a:ln>
+    </cs:spPr>
+  </cs:gridlineMinor>
+  <cs:hiLoLine>
+    <cs:lnRef idx="0"/>
+    <cs:fillRef idx="0"/>
+    <cs:effectRef idx="0"/>
+    <cs:fontRef idx="minor">
+      <a:schemeClr val="tx1"/>
+    </cs:fontRef>
+    <cs:spPr>
+      <a:ln w="9525" cap="flat" cmpd="sng" algn="ctr">
+        <a:solidFill>
+          <a:schemeClr val="tx1">
+            <a:lumMod val="50000"/>
+            <a:lumOff val="50000"/>
+          </a:schemeClr>
+        </a:solidFill>
+        <a:round/>
+      </a:ln>
+    </cs:spPr>
+  </cs:hiLoLine>
+  <cs:leaderLine>
+    <cs:lnRef idx="0"/>
+    <cs:fillRef idx="0"/>
+    <cs:effectRef idx="0"/>
+    <cs:fontRef idx="minor">
+      <a:schemeClr val="tx1"/>
+    </cs:fontRef>
+    <cs:spPr>
+      <a:ln w="9525" cap="flat" cmpd="sng" algn="ctr">
+        <a:solidFill>
+          <a:schemeClr val="tx1">
+            <a:lumMod val="35000"/>
+            <a:lumOff val="65000"/>
+          </a:schemeClr>
+        </a:solidFill>
+        <a:round/>
+      </a:ln>
+    </cs:spPr>
+  </cs:leaderLine>
+  <cs:legend>
+    <cs:lnRef idx="0"/>
+    <cs:fillRef idx="0"/>
+    <cs:effectRef idx="0"/>
+    <cs:fontRef idx="minor">
+      <a:schemeClr val="tx1">
+        <a:lumMod val="65000"/>
+        <a:lumOff val="35000"/>
+      </a:schemeClr>
+    </cs:fontRef>
+    <cs:defRPr sz="1197" kern="1200"/>
+  </cs:legend>
+  <cs:plotArea mods="allowNoFillOverride allowNoLineOverride">
+    <cs:lnRef idx="0"/>
+    <cs:fillRef idx="0"/>
+    <cs:effectRef idx="0"/>
+    <cs:fontRef idx="minor">
+      <a:schemeClr val="tx1"/>
+    </cs:fontRef>
+  </cs:plotArea>
+  <cs:plotArea3D mods="allowNoFillOverride allowNoLineOverride">
+    <cs:lnRef idx="0"/>
+    <cs:fillRef idx="0"/>
+    <cs:effectRef idx="0"/>
+    <cs:fontRef idx="minor">
+      <a:schemeClr val="tx1"/>
+    </cs:fontRef>
+  </cs:plotArea3D>
+  <cs:seriesAxis>
+    <cs:lnRef idx="0"/>
+    <cs:fillRef idx="0"/>
+    <cs:effectRef idx="0"/>
+    <cs:fontRef idx="minor">
+      <a:schemeClr val="tx1">
+        <a:lumMod val="65000"/>
+        <a:lumOff val="35000"/>
+      </a:schemeClr>
+    </cs:fontRef>
+    <cs:defRPr sz="1197" kern="1200"/>
+  </cs:seriesAxis>
+  <cs:seriesLine>
+    <cs:lnRef idx="0"/>
+    <cs:fillRef idx="0"/>
+    <cs:effectRef idx="0"/>
+    <cs:fontRef idx="minor">
+      <a:schemeClr val="tx1"/>
+    </cs:fontRef>
+    <cs:spPr>
+      <a:ln w="9525" cap="flat" cmpd="sng" algn="ctr">
+        <a:solidFill>
+          <a:schemeClr val="tx1">
+            <a:lumMod val="35000"/>
+            <a:lumOff val="65000"/>
+          </a:schemeClr>
+        </a:solidFill>
+        <a:round/>
+      </a:ln>
+    </cs:spPr>
+  </cs:seriesLine>
+  <cs:title>
+    <cs:lnRef idx="0"/>
+    <cs:fillRef idx="0"/>
+    <cs:effectRef idx="0"/>
+    <cs:fontRef idx="minor">
+      <a:schemeClr val="tx1">
+        <a:lumMod val="65000"/>
+        <a:lumOff val="35000"/>
+      </a:schemeClr>
+    </cs:fontRef>
+    <cs:defRPr sz="1862" b="0" kern="1200" spc="0" baseline="0"/>
+  </cs:title>
+  <cs:trendline>
+    <cs:lnRef idx="0">
+      <cs:styleClr val="auto"/>
+    </cs:lnRef>
+    <cs:fillRef idx="0"/>
+    <cs:effectRef idx="0"/>
+    <cs:fontRef idx="minor">
+      <a:schemeClr val="tx1"/>
+    </cs:fontRef>
+    <cs:spPr>
+      <a:ln w="19050" cap="rnd">
+        <a:solidFill>
+          <a:schemeClr val="phClr"/>
+        </a:solidFill>
+        <a:prstDash val="sysDot"/>
+      </a:ln>
+    </cs:spPr>
+  </cs:trendline>
+  <cs:trendlineLabel>
+    <cs:lnRef idx="0"/>
+    <cs:fillRef idx="0"/>
+    <cs:effectRef idx="0"/>
+    <cs:fontRef idx="minor">
+      <a:schemeClr val="tx1">
+        <a:lumMod val="65000"/>
+        <a:lumOff val="35000"/>
+      </a:schemeClr>
+    </cs:fontRef>
+    <cs:defRPr sz="1197" kern="1200"/>
+  </cs:trendlineLabel>
+  <cs:upBar>
+    <cs:lnRef idx="0"/>
+    <cs:fillRef idx="0"/>
+    <cs:effectRef idx="0"/>
+    <cs:fontRef idx="minor">
+      <a:schemeClr val="tx1"/>
+    </cs:fontRef>
+    <cs:spPr>
+      <a:solidFill>
+        <a:schemeClr val="lt1"/>
+      </a:solidFill>
+      <a:ln w="9525" cap="flat" cmpd="sng" algn="ctr">
+        <a:solidFill>
+          <a:schemeClr val="tx1">
+            <a:lumMod val="65000"/>
+            <a:lumOff val="35000"/>
+          </a:schemeClr>
+        </a:solidFill>
+        <a:round/>
+      </a:ln>
+    </cs:spPr>
+  </cs:upBar>
+  <cs:valueAxis>
+    <cs:lnRef idx="0"/>
+    <cs:fillRef idx="0"/>
+    <cs:effectRef idx="0"/>
+    <cs:fontRef idx="minor">
+      <a:schemeClr val="tx1">
+        <a:lumMod val="65000"/>
+        <a:lumOff val="35000"/>
+      </a:schemeClr>
+    </cs:fontRef>
+    <cs:spPr>
+      <a:ln w="9525" cap="flat" cmpd="sng" algn="ctr">
+        <a:solidFill>
+          <a:schemeClr val="tx1">
+            <a:lumMod val="25000"/>
+            <a:lumOff val="75000"/>
+          </a:schemeClr>
+        </a:solidFill>
+        <a:round/>
+      </a:ln>
+    </cs:spPr>
+    <cs:defRPr sz="1197" kern="1200"/>
+  </cs:valueAxis>
+  <cs:wall>
+    <cs:lnRef idx="0"/>
+    <cs:fillRef idx="0"/>
+    <cs:effectRef idx="0"/>
+    <cs:fontRef idx="minor">
+      <a:schemeClr val="tx1"/>
+    </cs:fontRef>
+    <cs:spPr>
+      <a:noFill/>
+      <a:ln>
+        <a:noFill/>
+      </a:ln>
+    </cs:spPr>
+  </cs:wall>
+</cs:chartStyle>
+</file>
+
+<file path=ppt/charts/style4.xml><?xml version="1.0" encoding="utf-8"?>
+<cs:chartStyle xmlns:cs="http://schemas.microsoft.com/office/drawing/2012/chartStyle" xmlns:a="http://schemas.openxmlformats.org/drawingml/2006/main" id="218">
+  <cs:axisTitle>
+    <cs:lnRef idx="0"/>
+    <cs:fillRef idx="0"/>
+    <cs:effectRef idx="0"/>
+    <cs:fontRef idx="minor">
+      <a:schemeClr val="dk1">
+        <a:lumMod val="75000"/>
+        <a:lumOff val="25000"/>
+      </a:schemeClr>
+    </cs:fontRef>
+    <cs:defRPr sz="1197" b="1" kern="1200"/>
+  </cs:axisTitle>
+  <cs:categoryAxis>
+    <cs:lnRef idx="0"/>
+    <cs:fillRef idx="0"/>
+    <cs:effectRef idx="0"/>
+    <cs:fontRef idx="minor">
+      <a:schemeClr val="dk1">
+        <a:lumMod val="75000"/>
+        <a:lumOff val="25000"/>
+      </a:schemeClr>
+    </cs:fontRef>
+    <cs:spPr>
+      <a:ln w="19050" cap="flat" cmpd="sng" algn="ctr">
+        <a:solidFill>
+          <a:schemeClr val="dk1">
+            <a:lumMod val="75000"/>
+            <a:lumOff val="25000"/>
+          </a:schemeClr>
+        </a:solidFill>
+        <a:round/>
+      </a:ln>
+    </cs:spPr>
+    <cs:defRPr sz="1197" kern="1200" cap="all" baseline="0"/>
+  </cs:categoryAxis>
+  <cs:chartArea>
+    <cs:lnRef idx="0"/>
+    <cs:fillRef idx="0"/>
+    <cs:effectRef idx="0"/>
+    <cs:fontRef idx="minor">
+      <a:schemeClr val="dk1"/>
+    </cs:fontRef>
+    <cs:spPr>
+      <a:gradFill flip="none" rotWithShape="1">
+        <a:gsLst>
+          <a:gs pos="0">
+            <a:schemeClr val="lt1"/>
+          </a:gs>
+          <a:gs pos="39000">
+            <a:schemeClr val="lt1"/>
+          </a:gs>
+          <a:gs pos="100000">
+            <a:schemeClr val="lt1">
+              <a:lumMod val="75000"/>
+            </a:schemeClr>
+          </a:gs>
+        </a:gsLst>
+        <a:path path="circle">
+          <a:fillToRect l="50000" t="-80000" r="50000" b="180000"/>
+        </a:path>
+        <a:tileRect/>
+      </a:gradFill>
+      <a:ln w="9525" cap="flat" cmpd="sng" algn="ctr">
+        <a:solidFill>
+          <a:schemeClr val="dk1">
+            <a:lumMod val="25000"/>
+            <a:lumOff val="75000"/>
+          </a:schemeClr>
+        </a:solidFill>
+        <a:round/>
+      </a:ln>
+    </cs:spPr>
+    <cs:defRPr sz="1197" kern="1200"/>
+  </cs:chartArea>
+  <cs:dataLabel>
+    <cs:lnRef idx="0"/>
+    <cs:fillRef idx="0"/>
+    <cs:effectRef idx="0"/>
+    <cs:fontRef idx="minor">
+      <a:schemeClr val="lt1"/>
+    </cs:fontRef>
+    <cs:defRPr sz="1197" b="1" i="0" u="none" strike="noStrike" kern="1200" baseline="0"/>
+  </cs:dataLabel>
+  <cs:dataLabelCallout>
+    <cs:lnRef idx="0"/>
+    <cs:fillRef idx="0"/>
+    <cs:effectRef idx="0"/>
+    <cs:fontRef idx="minor">
+      <a:schemeClr val="lt1"/>
+    </cs:fontRef>
+    <cs:spPr>
+      <a:solidFill>
+        <a:schemeClr val="dk1">
+          <a:lumMod val="65000"/>
+          <a:lumOff val="35000"/>
+          <a:alpha val="75000"/>
+        </a:schemeClr>
+      </a:solidFill>
+    </cs:spPr>
+    <cs:defRPr sz="1197" b="1" kern="1200"/>
+    <cs:bodyPr rot="0" spcFirstLastPara="1" vertOverflow="clip" horzOverflow="clip" vert="horz" wrap="square" lIns="36576" tIns="18288" rIns="36576" bIns="18288" anchor="ctr" anchorCtr="1">
+      <a:spAutoFit/>
+    </cs:bodyPr>
+  </cs:dataLabelCallout>
+  <cs:dataPoint>
+    <cs:lnRef idx="0"/>
+    <cs:fillRef idx="0">
+      <cs:styleClr val="auto"/>
+    </cs:fillRef>
+    <cs:effectRef idx="0"/>
+    <cs:fontRef idx="minor">
+      <a:schemeClr val="dk1"/>
+    </cs:fontRef>
+    <cs:spPr>
+      <a:solidFill>
+        <a:schemeClr val="phClr">
+          <a:alpha val="85000"/>
+        </a:schemeClr>
+      </a:solidFill>
+      <a:ln w="9525" cap="flat" cmpd="sng" algn="ctr">
+        <a:solidFill>
+          <a:schemeClr val="lt1">
+            <a:alpha val="50000"/>
+          </a:schemeClr>
+        </a:solidFill>
+        <a:round/>
+      </a:ln>
+    </cs:spPr>
+  </cs:dataPoint>
+  <cs:dataPoint3D>
+    <cs:lnRef idx="0"/>
+    <cs:fillRef idx="0">
+      <cs:styleClr val="auto"/>
+    </cs:fillRef>
+    <cs:effectRef idx="0"/>
+    <cs:fontRef idx="minor">
+      <a:schemeClr val="dk1"/>
+    </cs:fontRef>
+    <cs:spPr>
+      <a:solidFill>
+        <a:schemeClr val="phClr">
+          <a:alpha val="85000"/>
+        </a:schemeClr>
+      </a:solidFill>
+      <a:ln w="9525" cap="flat" cmpd="sng" algn="ctr">
+        <a:solidFill>
+          <a:schemeClr val="lt1">
+            <a:alpha val="50000"/>
+          </a:schemeClr>
+        </a:solidFill>
+        <a:round/>
+      </a:ln>
+    </cs:spPr>
+  </cs:dataPoint3D>
+  <cs:dataPointLine>
+    <cs:lnRef idx="0">
+      <cs:styleClr val="auto"/>
+    </cs:lnRef>
+    <cs:fillRef idx="0"/>
+    <cs:effectRef idx="0"/>
+    <cs:fontRef idx="minor">
+      <a:schemeClr val="dk1"/>
+    </cs:fontRef>
+    <cs:spPr>
+      <a:ln w="31750" cap="rnd">
+        <a:solidFill>
+          <a:schemeClr val="phClr">
+            <a:alpha val="85000"/>
+          </a:schemeClr>
+        </a:solidFill>
+        <a:round/>
+      </a:ln>
+    </cs:spPr>
+  </cs:dataPointLine>
+  <cs:dataPointMarker>
+    <cs:lnRef idx="0"/>
+    <cs:fillRef idx="0">
+      <cs:styleClr val="auto"/>
+    </cs:fillRef>
+    <cs:effectRef idx="0"/>
+    <cs:fontRef idx="minor">
+      <a:schemeClr val="dk1"/>
+    </cs:fontRef>
+    <cs:spPr>
+      <a:solidFill>
+        <a:schemeClr val="phClr">
+          <a:alpha val="85000"/>
+        </a:schemeClr>
+      </a:solidFill>
+    </cs:spPr>
+  </cs:dataPointMarker>
+  <cs:dataPointMarkerLayout symbol="circle" size="6"/>
+  <cs:dataPointWireframe>
+    <cs:lnRef idx="0">
+      <cs:styleClr val="auto"/>
+    </cs:lnRef>
+    <cs:fillRef idx="0"/>
+    <cs:effectRef idx="0"/>
+    <cs:fontRef idx="minor">
+      <a:schemeClr val="dk1"/>
+    </cs:fontRef>
+    <cs:spPr>
+      <a:ln w="9525" cap="rnd">
+        <a:solidFill>
+          <a:schemeClr val="phClr"/>
+        </a:solidFill>
+        <a:round/>
+      </a:ln>
+    </cs:spPr>
+  </cs:dataPointWireframe>
+  <cs:dataTable>
+    <cs:lnRef idx="0"/>
+    <cs:fillRef idx="0"/>
+    <cs:effectRef idx="0"/>
+    <cs:fontRef idx="minor">
+      <a:schemeClr val="dk1">
+        <a:lumMod val="75000"/>
+        <a:lumOff val="25000"/>
+      </a:schemeClr>
+    </cs:fontRef>
+    <cs:spPr>
+      <a:ln w="9525">
+        <a:solidFill>
+          <a:schemeClr val="dk1">
+            <a:lumMod val="35000"/>
+            <a:lumOff val="65000"/>
+          </a:schemeClr>
+        </a:solidFill>
+      </a:ln>
+    </cs:spPr>
+    <cs:defRPr sz="1197" kern="1200"/>
+  </cs:dataTable>
+  <cs:downBar>
+    <cs:lnRef idx="0"/>
+    <cs:fillRef idx="0"/>
+    <cs:effectRef idx="0"/>
+    <cs:fontRef idx="minor">
+      <a:schemeClr val="dk1"/>
+    </cs:fontRef>
+    <cs:spPr>
+      <a:solidFill>
+        <a:schemeClr val="dk1">
+          <a:lumMod val="50000"/>
+          <a:lumOff val="50000"/>
+        </a:schemeClr>
+      </a:solidFill>
+      <a:ln w="9525">
+        <a:solidFill>
+          <a:schemeClr val="dk1">
+            <a:lumMod val="65000"/>
+            <a:lumOff val="35000"/>
+          </a:schemeClr>
+        </a:solidFill>
+      </a:ln>
+    </cs:spPr>
+  </cs:downBar>
+  <cs:dropLine>
+    <cs:lnRef idx="0"/>
+    <cs:fillRef idx="0"/>
+    <cs:effectRef idx="0"/>
+    <cs:fontRef idx="minor">
+      <a:schemeClr val="dk1"/>
+    </cs:fontRef>
+    <cs:spPr>
+      <a:ln w="9525">
+        <a:solidFill>
+          <a:schemeClr val="dk1">
+            <a:lumMod val="35000"/>
+            <a:lumOff val="65000"/>
+          </a:schemeClr>
+        </a:solidFill>
+        <a:prstDash val="dash"/>
+      </a:ln>
+    </cs:spPr>
+  </cs:dropLine>
+  <cs:errorBar>
+    <cs:lnRef idx="0"/>
+    <cs:fillRef idx="0"/>
+    <cs:effectRef idx="0"/>
+    <cs:fontRef idx="minor">
+      <a:schemeClr val="dk1"/>
+    </cs:fontRef>
+    <cs:spPr>
+      <a:ln w="9525">
+        <a:solidFill>
+          <a:schemeClr val="dk1">
+            <a:lumMod val="65000"/>
+            <a:lumOff val="35000"/>
+          </a:schemeClr>
+        </a:solidFill>
+        <a:round/>
+      </a:ln>
+    </cs:spPr>
+  </cs:errorBar>
+  <cs:floor>
+    <cs:lnRef idx="0"/>
+    <cs:fillRef idx="0"/>
+    <cs:effectRef idx="0"/>
+    <cs:fontRef idx="minor">
+      <a:schemeClr val="dk1"/>
+    </cs:fontRef>
+  </cs:floor>
+  <cs:gridlineMajor>
+    <cs:lnRef idx="0"/>
+    <cs:fillRef idx="0"/>
+    <cs:effectRef idx="0"/>
+    <cs:fontRef idx="minor">
+      <a:schemeClr val="dk1"/>
+    </cs:fontRef>
+    <cs:spPr>
+      <a:ln w="9525" cap="flat" cmpd="sng" algn="ctr">
+        <a:gradFill>
+          <a:gsLst>
+            <a:gs pos="100000">
+              <a:schemeClr val="dk1">
+                <a:lumMod val="95000"/>
+                <a:lumOff val="5000"/>
+                <a:alpha val="42000"/>
+              </a:schemeClr>
+            </a:gs>
+            <a:gs pos="0">
+              <a:schemeClr val="lt1">
+                <a:lumMod val="75000"/>
+                <a:alpha val="36000"/>
+              </a:schemeClr>
+            </a:gs>
+          </a:gsLst>
+          <a:lin ang="5400000" scaled="0"/>
+        </a:gradFill>
+        <a:round/>
+      </a:ln>
+    </cs:spPr>
+  </cs:gridlineMajor>
+  <cs:gridlineMinor>
+    <cs:lnRef idx="0"/>
+    <cs:fillRef idx="0"/>
+    <cs:effectRef idx="0"/>
+    <cs:fontRef idx="minor">
+      <a:schemeClr val="dk1"/>
+    </cs:fontRef>
+    <cs:spPr>
+      <a:ln>
+        <a:gradFill>
+          <a:gsLst>
+            <a:gs pos="100000">
+              <a:schemeClr val="dk1">
+                <a:lumMod val="95000"/>
+                <a:lumOff val="5000"/>
+                <a:alpha val="42000"/>
+              </a:schemeClr>
+            </a:gs>
+            <a:gs pos="0">
+              <a:schemeClr val="lt1">
+                <a:lumMod val="75000"/>
+                <a:alpha val="36000"/>
+              </a:schemeClr>
+            </a:gs>
+          </a:gsLst>
+          <a:lin ang="5400000" scaled="0"/>
+        </a:gradFill>
+      </a:ln>
+    </cs:spPr>
+  </cs:gridlineMinor>
+  <cs:hiLoLine>
+    <cs:lnRef idx="0"/>
+    <cs:fillRef idx="0"/>
+    <cs:effectRef idx="0"/>
+    <cs:fontRef idx="minor">
+      <a:schemeClr val="dk1"/>
+    </cs:fontRef>
+    <cs:spPr>
+      <a:ln w="9525">
+        <a:solidFill>
+          <a:schemeClr val="dk1">
+            <a:lumMod val="35000"/>
+            <a:lumOff val="65000"/>
+          </a:schemeClr>
+        </a:solidFill>
+        <a:prstDash val="dash"/>
+      </a:ln>
+    </cs:spPr>
+  </cs:hiLoLine>
+  <cs:leaderLine>
+    <cs:lnRef idx="0"/>
+    <cs:fillRef idx="0"/>
+    <cs:effectRef idx="0"/>
+    <cs:fontRef idx="minor">
+      <a:schemeClr val="dk1"/>
+    </cs:fontRef>
+    <cs:spPr>
+      <a:ln w="9525">
+        <a:solidFill>
+          <a:schemeClr val="dk1">
+            <a:lumMod val="50000"/>
+            <a:lumOff val="50000"/>
+          </a:schemeClr>
+        </a:solidFill>
+      </a:ln>
+    </cs:spPr>
+  </cs:leaderLine>
+  <cs:legend>
+    <cs:lnRef idx="0"/>
+    <cs:fillRef idx="0"/>
+    <cs:effectRef idx="0"/>
+    <cs:fontRef idx="minor">
+      <a:schemeClr val="dk1">
+        <a:lumMod val="75000"/>
+        <a:lumOff val="25000"/>
+      </a:schemeClr>
+    </cs:fontRef>
+    <cs:spPr>
+      <a:solidFill>
+        <a:schemeClr val="lt1">
+          <a:lumMod val="95000"/>
+          <a:alpha val="39000"/>
+        </a:schemeClr>
+      </a:solidFill>
+    </cs:spPr>
+    <cs:defRPr sz="1197" kern="1200"/>
+  </cs:legend>
+  <cs:plotArea>
+    <cs:lnRef idx="0"/>
+    <cs:fillRef idx="0"/>
+    <cs:effectRef idx="0"/>
+    <cs:fontRef idx="minor">
+      <a:schemeClr val="dk1"/>
+    </cs:fontRef>
+  </cs:plotArea>
+  <cs:plotArea3D>
+    <cs:lnRef idx="0"/>
+    <cs:fillRef idx="0"/>
+    <cs:effectRef idx="0"/>
+    <cs:fontRef idx="minor">
+      <a:schemeClr val="dk1"/>
+    </cs:fontRef>
+  </cs:plotArea3D>
+  <cs:seriesAxis>
+    <cs:lnRef idx="0"/>
+    <cs:fillRef idx="0"/>
+    <cs:effectRef idx="0"/>
+    <cs:fontRef idx="minor">
+      <a:schemeClr val="dk1">
+        <a:lumMod val="75000"/>
+        <a:lumOff val="25000"/>
+      </a:schemeClr>
+    </cs:fontRef>
+    <cs:spPr>
+      <a:ln w="31750" cap="flat" cmpd="sng" algn="ctr">
+        <a:solidFill>
+          <a:schemeClr val="dk1">
+            <a:lumMod val="75000"/>
+            <a:lumOff val="25000"/>
+          </a:schemeClr>
+        </a:solidFill>
+        <a:round/>
+      </a:ln>
+    </cs:spPr>
+    <cs:defRPr sz="1197" kern="1200"/>
+  </cs:seriesAxis>
+  <cs:seriesLine>
+    <cs:lnRef idx="0"/>
+    <cs:fillRef idx="0"/>
+    <cs:effectRef idx="0"/>
+    <cs:fontRef idx="minor">
+      <a:schemeClr val="dk1"/>
+    </cs:fontRef>
+    <cs:spPr>
+      <a:ln w="9525">
+        <a:solidFill>
+          <a:schemeClr val="dk1">
+            <a:lumMod val="50000"/>
+            <a:lumOff val="50000"/>
+          </a:schemeClr>
+        </a:solidFill>
+        <a:round/>
+      </a:ln>
+    </cs:spPr>
+  </cs:seriesLine>
+  <cs:title>
+    <cs:lnRef idx="0"/>
+    <cs:fillRef idx="0"/>
+    <cs:effectRef idx="0"/>
+    <cs:fontRef idx="minor">
+      <a:schemeClr val="dk1">
+        <a:lumMod val="75000"/>
+        <a:lumOff val="25000"/>
+      </a:schemeClr>
+    </cs:fontRef>
+    <cs:defRPr sz="2200" b="1" kern="1200" baseline="0"/>
+  </cs:title>
+  <cs:trendline>
+    <cs:lnRef idx="0">
+      <cs:styleClr val="auto"/>
+    </cs:lnRef>
+    <cs:fillRef idx="0"/>
+    <cs:effectRef idx="0"/>
+    <cs:fontRef idx="minor">
+      <a:schemeClr val="dk1"/>
+    </cs:fontRef>
+    <cs:spPr>
+      <a:ln w="19050" cap="rnd">
+        <a:solidFill>
+          <a:schemeClr val="phClr"/>
+        </a:solidFill>
+      </a:ln>
+    </cs:spPr>
+  </cs:trendline>
+  <cs:trendlineLabel>
+    <cs:lnRef idx="0"/>
+    <cs:fillRef idx="0"/>
+    <cs:effectRef idx="0"/>
+    <cs:fontRef idx="minor">
+      <a:schemeClr val="dk1">
+        <a:lumMod val="75000"/>
+        <a:lumOff val="25000"/>
+      </a:schemeClr>
+    </cs:fontRef>
+    <cs:defRPr sz="1197" kern="1200"/>
+  </cs:trendlineLabel>
+  <cs:upBar>
+    <cs:lnRef idx="0"/>
+    <cs:fillRef idx="0"/>
+    <cs:effectRef idx="0"/>
+    <cs:fontRef idx="minor">
+      <a:schemeClr val="dk1"/>
+    </cs:fontRef>
+    <cs:spPr>
+      <a:solidFill>
+        <a:schemeClr val="lt1"/>
+      </a:solidFill>
+      <a:ln w="9525">
+        <a:solidFill>
+          <a:schemeClr val="dk1">
+            <a:lumMod val="65000"/>
+            <a:lumOff val="35000"/>
+          </a:schemeClr>
+        </a:solidFill>
+      </a:ln>
+    </cs:spPr>
+  </cs:upBar>
+  <cs:valueAxis>
+    <cs:lnRef idx="0"/>
+    <cs:fillRef idx="0"/>
+    <cs:effectRef idx="0"/>
+    <cs:fontRef idx="minor">
+      <a:schemeClr val="dk1">
+        <a:lumMod val="75000"/>
+        <a:lumOff val="25000"/>
+      </a:schemeClr>
+    </cs:fontRef>
+    <cs:spPr>
+      <a:ln>
+        <a:noFill/>
+      </a:ln>
+    </cs:spPr>
+    <cs:defRPr sz="1197" kern="1200"/>
+  </cs:valueAxis>
+  <cs:wall>
+    <cs:lnRef idx="0"/>
+    <cs:fillRef idx="0"/>
+    <cs:effectRef idx="0"/>
+    <cs:fontRef idx="minor">
+      <a:schemeClr val="dk1"/>
+    </cs:fontRef>
+  </cs:wall>
+</cs:chartStyle>
 </file>
 
 <file path=ppt/slideLayouts/slideLayout1.xml><?xml version="1.0" encoding="utf-8"?>
@@ -3144,19 +7458,7 @@
               <a:rPr lang="en-US" sz="2400" dirty="0" smtClean="0">
                 <a:latin typeface="Bookman Old Style" panose="02050604050505020204" pitchFamily="18" charset="0"/>
               </a:rPr>
-              <a:t>Non Fault </a:t>
-            </a:r>
-            <a:r>
-              <a:rPr lang="en-US" sz="2400" dirty="0" smtClean="0">
-                <a:latin typeface="Bookman Old Style" panose="02050604050505020204" pitchFamily="18" charset="0"/>
-              </a:rPr>
-              <a:t>tolerant</a:t>
-            </a:r>
-            <a:r>
-              <a:rPr lang="en-US" sz="2400" dirty="0" smtClean="0">
-                <a:latin typeface="Bookman Old Style" panose="02050604050505020204" pitchFamily="18" charset="0"/>
-              </a:rPr>
-              <a:t>, Non transactional batch spouts</a:t>
+              <a:t>Non Fault tolerant, Non transactional batch spouts</a:t>
             </a:r>
             <a:endParaRPr lang="en-US" sz="2400" dirty="0">
               <a:latin typeface="Bookman Old Style" panose="02050604050505020204" pitchFamily="18" charset="0"/>
@@ -3168,6 +7470,223 @@
     <p:extLst>
       <p:ext uri="{BB962C8B-B14F-4D97-AF65-F5344CB8AC3E}">
         <p14:creationId xmlns:p14="http://schemas.microsoft.com/office/powerpoint/2010/main" val="3872785540"/>
+      </p:ext>
+    </p:extLst>
+  </p:cSld>
+  <p:clrMapOvr>
+    <a:masterClrMapping/>
+  </p:clrMapOvr>
+</p:sld>
+</file>
+
+<file path=ppt/slides/slide3.xml><?xml version="1.0" encoding="utf-8"?>
+<p:sld xmlns:a="http://schemas.openxmlformats.org/drawingml/2006/main" xmlns:r="http://schemas.openxmlformats.org/officeDocument/2006/relationships" xmlns:p="http://schemas.openxmlformats.org/presentationml/2006/main">
+  <p:cSld>
+    <p:spTree>
+      <p:nvGrpSpPr>
+        <p:cNvPr id="1" name=""/>
+        <p:cNvGrpSpPr/>
+        <p:nvPr/>
+      </p:nvGrpSpPr>
+      <p:grpSpPr>
+        <a:xfrm>
+          <a:off x="0" y="0"/>
+          <a:ext cx="0" cy="0"/>
+          <a:chOff x="0" y="0"/>
+          <a:chExt cx="0" cy="0"/>
+        </a:xfrm>
+      </p:grpSpPr>
+      <p:graphicFrame>
+        <p:nvGraphicFramePr>
+          <p:cNvPr id="8" name="Content Placeholder 7"/>
+          <p:cNvGraphicFramePr>
+            <a:graphicFrameLocks noGrp="1"/>
+          </p:cNvGraphicFramePr>
+          <p:nvPr>
+            <p:ph idx="4294967295"/>
+            <p:extLst>
+              <p:ext uri="{D42A27DB-BD31-4B8C-83A1-F6EECF244321}">
+                <p14:modId xmlns:p14="http://schemas.microsoft.com/office/powerpoint/2010/main" val="499975921"/>
+              </p:ext>
+            </p:extLst>
+          </p:nvPr>
+        </p:nvGraphicFramePr>
+        <p:xfrm>
+          <a:off x="-1" y="347730"/>
+          <a:ext cx="11874321" cy="5829233"/>
+        </p:xfrm>
+        <a:graphic>
+          <a:graphicData uri="http://schemas.openxmlformats.org/drawingml/2006/chart">
+            <c:chart xmlns:c="http://schemas.openxmlformats.org/drawingml/2006/chart" xmlns:r="http://schemas.openxmlformats.org/officeDocument/2006/relationships" r:id="rId2"/>
+          </a:graphicData>
+        </a:graphic>
+      </p:graphicFrame>
+    </p:spTree>
+    <p:extLst>
+      <p:ext uri="{BB962C8B-B14F-4D97-AF65-F5344CB8AC3E}">
+        <p14:creationId xmlns:p14="http://schemas.microsoft.com/office/powerpoint/2010/main" val="484235222"/>
+      </p:ext>
+    </p:extLst>
+  </p:cSld>
+  <p:clrMapOvr>
+    <a:masterClrMapping/>
+  </p:clrMapOvr>
+</p:sld>
+</file>
+
+<file path=ppt/slides/slide4.xml><?xml version="1.0" encoding="utf-8"?>
+<p:sld xmlns:a="http://schemas.openxmlformats.org/drawingml/2006/main" xmlns:r="http://schemas.openxmlformats.org/officeDocument/2006/relationships" xmlns:p="http://schemas.openxmlformats.org/presentationml/2006/main">
+  <p:cSld>
+    <p:spTree>
+      <p:nvGrpSpPr>
+        <p:cNvPr id="1" name=""/>
+        <p:cNvGrpSpPr/>
+        <p:nvPr/>
+      </p:nvGrpSpPr>
+      <p:grpSpPr>
+        <a:xfrm>
+          <a:off x="0" y="0"/>
+          <a:ext cx="0" cy="0"/>
+          <a:chOff x="0" y="0"/>
+          <a:chExt cx="0" cy="0"/>
+        </a:xfrm>
+      </p:grpSpPr>
+      <p:graphicFrame>
+        <p:nvGraphicFramePr>
+          <p:cNvPr id="2" name="Chart 1"/>
+          <p:cNvGraphicFramePr>
+            <a:graphicFrameLocks/>
+          </p:cNvGraphicFramePr>
+          <p:nvPr>
+            <p:extLst>
+              <p:ext uri="{D42A27DB-BD31-4B8C-83A1-F6EECF244321}">
+                <p14:modId xmlns:p14="http://schemas.microsoft.com/office/powerpoint/2010/main" val="1226913069"/>
+              </p:ext>
+            </p:extLst>
+          </p:nvPr>
+        </p:nvGraphicFramePr>
+        <p:xfrm>
+          <a:off x="90152" y="283335"/>
+          <a:ext cx="11642502" cy="6413679"/>
+        </p:xfrm>
+        <a:graphic>
+          <a:graphicData uri="http://schemas.openxmlformats.org/drawingml/2006/chart">
+            <c:chart xmlns:c="http://schemas.openxmlformats.org/drawingml/2006/chart" xmlns:r="http://schemas.openxmlformats.org/officeDocument/2006/relationships" r:id="rId2"/>
+          </a:graphicData>
+        </a:graphic>
+      </p:graphicFrame>
+    </p:spTree>
+    <p:extLst>
+      <p:ext uri="{BB962C8B-B14F-4D97-AF65-F5344CB8AC3E}">
+        <p14:creationId xmlns:p14="http://schemas.microsoft.com/office/powerpoint/2010/main" val="922327007"/>
+      </p:ext>
+    </p:extLst>
+  </p:cSld>
+  <p:clrMapOvr>
+    <a:masterClrMapping/>
+  </p:clrMapOvr>
+</p:sld>
+</file>
+
+<file path=ppt/slides/slide5.xml><?xml version="1.0" encoding="utf-8"?>
+<p:sld xmlns:a="http://schemas.openxmlformats.org/drawingml/2006/main" xmlns:r="http://schemas.openxmlformats.org/officeDocument/2006/relationships" xmlns:p="http://schemas.openxmlformats.org/presentationml/2006/main">
+  <p:cSld>
+    <p:spTree>
+      <p:nvGrpSpPr>
+        <p:cNvPr id="1" name=""/>
+        <p:cNvGrpSpPr/>
+        <p:nvPr/>
+      </p:nvGrpSpPr>
+      <p:grpSpPr>
+        <a:xfrm>
+          <a:off x="0" y="0"/>
+          <a:ext cx="0" cy="0"/>
+          <a:chOff x="0" y="0"/>
+          <a:chExt cx="0" cy="0"/>
+        </a:xfrm>
+      </p:grpSpPr>
+      <p:graphicFrame>
+        <p:nvGraphicFramePr>
+          <p:cNvPr id="2" name="Chart 1"/>
+          <p:cNvGraphicFramePr>
+            <a:graphicFrameLocks/>
+          </p:cNvGraphicFramePr>
+          <p:nvPr>
+            <p:extLst>
+              <p:ext uri="{D42A27DB-BD31-4B8C-83A1-F6EECF244321}">
+                <p14:modId xmlns:p14="http://schemas.microsoft.com/office/powerpoint/2010/main" val="493626873"/>
+              </p:ext>
+            </p:extLst>
+          </p:nvPr>
+        </p:nvGraphicFramePr>
+        <p:xfrm>
+          <a:off x="0" y="0"/>
+          <a:ext cx="12192000" cy="6761408"/>
+        </p:xfrm>
+        <a:graphic>
+          <a:graphicData uri="http://schemas.openxmlformats.org/drawingml/2006/chart">
+            <c:chart xmlns:c="http://schemas.openxmlformats.org/drawingml/2006/chart" xmlns:r="http://schemas.openxmlformats.org/officeDocument/2006/relationships" r:id="rId2"/>
+          </a:graphicData>
+        </a:graphic>
+      </p:graphicFrame>
+    </p:spTree>
+    <p:extLst>
+      <p:ext uri="{BB962C8B-B14F-4D97-AF65-F5344CB8AC3E}">
+        <p14:creationId xmlns:p14="http://schemas.microsoft.com/office/powerpoint/2010/main" val="1373697282"/>
+      </p:ext>
+    </p:extLst>
+  </p:cSld>
+  <p:clrMapOvr>
+    <a:masterClrMapping/>
+  </p:clrMapOvr>
+</p:sld>
+</file>
+
+<file path=ppt/slides/slide6.xml><?xml version="1.0" encoding="utf-8"?>
+<p:sld xmlns:a="http://schemas.openxmlformats.org/drawingml/2006/main" xmlns:r="http://schemas.openxmlformats.org/officeDocument/2006/relationships" xmlns:p="http://schemas.openxmlformats.org/presentationml/2006/main">
+  <p:cSld>
+    <p:spTree>
+      <p:nvGrpSpPr>
+        <p:cNvPr id="1" name=""/>
+        <p:cNvGrpSpPr/>
+        <p:nvPr/>
+      </p:nvGrpSpPr>
+      <p:grpSpPr>
+        <a:xfrm>
+          <a:off x="0" y="0"/>
+          <a:ext cx="0" cy="0"/>
+          <a:chOff x="0" y="0"/>
+          <a:chExt cx="0" cy="0"/>
+        </a:xfrm>
+      </p:grpSpPr>
+      <p:graphicFrame>
+        <p:nvGraphicFramePr>
+          <p:cNvPr id="2" name="Chart 1"/>
+          <p:cNvGraphicFramePr>
+            <a:graphicFrameLocks/>
+          </p:cNvGraphicFramePr>
+          <p:nvPr>
+            <p:extLst>
+              <p:ext uri="{D42A27DB-BD31-4B8C-83A1-F6EECF244321}">
+                <p14:modId xmlns:p14="http://schemas.microsoft.com/office/powerpoint/2010/main" val="2290646938"/>
+              </p:ext>
+            </p:extLst>
+          </p:nvPr>
+        </p:nvGraphicFramePr>
+        <p:xfrm>
+          <a:off x="1" y="0"/>
+          <a:ext cx="11964472" cy="6858000"/>
+        </p:xfrm>
+        <a:graphic>
+          <a:graphicData uri="http://schemas.openxmlformats.org/drawingml/2006/chart">
+            <c:chart xmlns:c="http://schemas.openxmlformats.org/drawingml/2006/chart" xmlns:r="http://schemas.openxmlformats.org/officeDocument/2006/relationships" r:id="rId2"/>
+          </a:graphicData>
+        </a:graphic>
+      </p:graphicFrame>
+    </p:spTree>
+    <p:extLst>
+      <p:ext uri="{BB962C8B-B14F-4D97-AF65-F5344CB8AC3E}">
+        <p14:creationId xmlns:p14="http://schemas.microsoft.com/office/powerpoint/2010/main" val="3810244628"/>
       </p:ext>
     </p:extLst>
   </p:cSld>

</xml_diff>